<commit_message>
Update: interface screen shots added, milestone 5 complete
</commit_message>
<xml_diff>
--- a/Milestone 5/ENSE 470 Milestone 5.pptx
+++ b/Milestone 5/ENSE 470 Milestone 5.pptx
@@ -10,14 +10,13 @@
     <p:sldId id="267" r:id="rId4"/>
     <p:sldId id="268" r:id="rId5"/>
     <p:sldId id="269" r:id="rId6"/>
-    <p:sldId id="263" r:id="rId7"/>
-    <p:sldId id="266" r:id="rId8"/>
-    <p:sldId id="264" r:id="rId9"/>
-    <p:sldId id="265" r:id="rId10"/>
-    <p:sldId id="270" r:id="rId11"/>
-    <p:sldId id="261" r:id="rId12"/>
-    <p:sldId id="259" r:id="rId13"/>
-    <p:sldId id="260" r:id="rId14"/>
+    <p:sldId id="266" r:id="rId7"/>
+    <p:sldId id="264" r:id="rId8"/>
+    <p:sldId id="265" r:id="rId9"/>
+    <p:sldId id="270" r:id="rId10"/>
+    <p:sldId id="261" r:id="rId11"/>
+    <p:sldId id="259" r:id="rId12"/>
+    <p:sldId id="260" r:id="rId13"/>
   </p:sldIdLst>
   <p:sldSz cx="12192000" cy="6858000"/>
   <p:notesSz cx="6858000" cy="9144000"/>
@@ -174,7 +173,7 @@
           <a:noFill/>
           <a:extLst>
             <a:ext uri="{909E8E84-426E-40dd-AFC4-6F175D3DCCD1}">
-              <a14:hiddenFill xmlns="" xmlns:a14="http://schemas.microsoft.com/office/drawing/2010/main">
+              <a14:hiddenFill xmlns:a14="http://schemas.microsoft.com/office/drawing/2010/main" xmlns="">
                 <a:solidFill>
                   <a:srgbClr val="FFFFFF"/>
                 </a:solidFill>
@@ -234,7 +233,7 @@
             </a:ln>
             <a:extLst>
               <a:ext uri="{91240B29-F687-4f45-9708-019B960494DF}">
-                <a14:hiddenLine xmlns="" xmlns:a14="http://schemas.microsoft.com/office/drawing/2010/main" w="9525">
+                <a14:hiddenLine xmlns:a14="http://schemas.microsoft.com/office/drawing/2010/main" xmlns="" w="9525">
                   <a:solidFill>
                     <a:srgbClr val="000000"/>
                   </a:solidFill>
@@ -324,7 +323,7 @@
             </a:ln>
             <a:extLst>
               <a:ext uri="{91240B29-F687-4f45-9708-019B960494DF}">
-                <a14:hiddenLine xmlns="" xmlns:a14="http://schemas.microsoft.com/office/drawing/2010/main" w="9525">
+                <a14:hiddenLine xmlns:a14="http://schemas.microsoft.com/office/drawing/2010/main" xmlns="" w="9525">
                   <a:solidFill>
                     <a:srgbClr val="000000"/>
                   </a:solidFill>
@@ -414,7 +413,7 @@
             </a:ln>
             <a:extLst>
               <a:ext uri="{91240B29-F687-4f45-9708-019B960494DF}">
-                <a14:hiddenLine xmlns="" xmlns:a14="http://schemas.microsoft.com/office/drawing/2010/main" w="9525">
+                <a14:hiddenLine xmlns:a14="http://schemas.microsoft.com/office/drawing/2010/main" xmlns="" w="9525">
                   <a:solidFill>
                     <a:srgbClr val="000000"/>
                   </a:solidFill>
@@ -448,7 +447,7 @@
             </a:ln>
             <a:extLst>
               <a:ext uri="{91240B29-F687-4f45-9708-019B960494DF}">
-                <a14:hiddenLine xmlns="" xmlns:a14="http://schemas.microsoft.com/office/drawing/2010/main" w="9525">
+                <a14:hiddenLine xmlns:a14="http://schemas.microsoft.com/office/drawing/2010/main" xmlns="" w="9525">
                   <a:solidFill>
                     <a:srgbClr val="000000"/>
                   </a:solidFill>
@@ -538,7 +537,7 @@
             </a:ln>
             <a:extLst>
               <a:ext uri="{91240B29-F687-4f45-9708-019B960494DF}">
-                <a14:hiddenLine xmlns="" xmlns:a14="http://schemas.microsoft.com/office/drawing/2010/main" w="9525">
+                <a14:hiddenLine xmlns:a14="http://schemas.microsoft.com/office/drawing/2010/main" xmlns="" w="9525">
                   <a:solidFill>
                     <a:srgbClr val="000000"/>
                   </a:solidFill>
@@ -600,7 +599,7 @@
             </a:ln>
             <a:extLst>
               <a:ext uri="{91240B29-F687-4f45-9708-019B960494DF}">
-                <a14:hiddenLine xmlns="" xmlns:a14="http://schemas.microsoft.com/office/drawing/2010/main" w="9525">
+                <a14:hiddenLine xmlns:a14="http://schemas.microsoft.com/office/drawing/2010/main" xmlns="" w="9525">
                   <a:solidFill>
                     <a:srgbClr val="000000"/>
                   </a:solidFill>
@@ -662,7 +661,7 @@
             </a:ln>
             <a:extLst>
               <a:ext uri="{91240B29-F687-4f45-9708-019B960494DF}">
-                <a14:hiddenLine xmlns="" xmlns:a14="http://schemas.microsoft.com/office/drawing/2010/main" w="9525">
+                <a14:hiddenLine xmlns:a14="http://schemas.microsoft.com/office/drawing/2010/main" xmlns="" w="9525">
                   <a:solidFill>
                     <a:srgbClr val="000000"/>
                   </a:solidFill>
@@ -752,7 +751,7 @@
             </a:ln>
             <a:extLst>
               <a:ext uri="{91240B29-F687-4f45-9708-019B960494DF}">
-                <a14:hiddenLine xmlns="" xmlns:a14="http://schemas.microsoft.com/office/drawing/2010/main" w="9525">
+                <a14:hiddenLine xmlns:a14="http://schemas.microsoft.com/office/drawing/2010/main" xmlns="" w="9525">
                   <a:solidFill>
                     <a:srgbClr val="000000"/>
                   </a:solidFill>
@@ -814,7 +813,7 @@
             </a:ln>
             <a:extLst>
               <a:ext uri="{91240B29-F687-4f45-9708-019B960494DF}">
-                <a14:hiddenLine xmlns="" xmlns:a14="http://schemas.microsoft.com/office/drawing/2010/main" w="9525">
+                <a14:hiddenLine xmlns:a14="http://schemas.microsoft.com/office/drawing/2010/main" xmlns="" w="9525">
                   <a:solidFill>
                     <a:srgbClr val="000000"/>
                   </a:solidFill>
@@ -876,7 +875,7 @@
             </a:ln>
             <a:extLst>
               <a:ext uri="{91240B29-F687-4f45-9708-019B960494DF}">
-                <a14:hiddenLine xmlns="" xmlns:a14="http://schemas.microsoft.com/office/drawing/2010/main" w="9525">
+                <a14:hiddenLine xmlns:a14="http://schemas.microsoft.com/office/drawing/2010/main" xmlns="" w="9525">
                   <a:solidFill>
                     <a:srgbClr val="000000"/>
                   </a:solidFill>
@@ -966,7 +965,7 @@
             </a:ln>
             <a:extLst>
               <a:ext uri="{91240B29-F687-4f45-9708-019B960494DF}">
-                <a14:hiddenLine xmlns="" xmlns:a14="http://schemas.microsoft.com/office/drawing/2010/main" w="9525">
+                <a14:hiddenLine xmlns:a14="http://schemas.microsoft.com/office/drawing/2010/main" xmlns="" w="9525">
                   <a:solidFill>
                     <a:srgbClr val="000000"/>
                   </a:solidFill>
@@ -1056,7 +1055,7 @@
             </a:ln>
             <a:extLst>
               <a:ext uri="{91240B29-F687-4f45-9708-019B960494DF}">
-                <a14:hiddenLine xmlns="" xmlns:a14="http://schemas.microsoft.com/office/drawing/2010/main" w="9525">
+                <a14:hiddenLine xmlns:a14="http://schemas.microsoft.com/office/drawing/2010/main" xmlns="" w="9525">
                   <a:solidFill>
                     <a:srgbClr val="000000"/>
                   </a:solidFill>
@@ -1118,7 +1117,7 @@
             </a:ln>
             <a:extLst>
               <a:ext uri="{91240B29-F687-4f45-9708-019B960494DF}">
-                <a14:hiddenLine xmlns="" xmlns:a14="http://schemas.microsoft.com/office/drawing/2010/main" w="9525">
+                <a14:hiddenLine xmlns:a14="http://schemas.microsoft.com/office/drawing/2010/main" xmlns="" w="9525">
                   <a:solidFill>
                     <a:srgbClr val="000000"/>
                   </a:solidFill>
@@ -1228,7 +1227,7 @@
             </a:ln>
             <a:extLst>
               <a:ext uri="{91240B29-F687-4f45-9708-019B960494DF}">
-                <a14:hiddenLine xmlns="" xmlns:a14="http://schemas.microsoft.com/office/drawing/2010/main" w="9525">
+                <a14:hiddenLine xmlns:a14="http://schemas.microsoft.com/office/drawing/2010/main" xmlns="" w="9525">
                   <a:solidFill>
                     <a:srgbClr val="000000"/>
                   </a:solidFill>
@@ -1290,7 +1289,7 @@
             </a:ln>
             <a:extLst>
               <a:ext uri="{91240B29-F687-4f45-9708-019B960494DF}">
-                <a14:hiddenLine xmlns="" xmlns:a14="http://schemas.microsoft.com/office/drawing/2010/main" w="9525">
+                <a14:hiddenLine xmlns:a14="http://schemas.microsoft.com/office/drawing/2010/main" xmlns="" w="9525">
                   <a:solidFill>
                     <a:srgbClr val="000000"/>
                   </a:solidFill>
@@ -1380,7 +1379,7 @@
             </a:ln>
             <a:extLst>
               <a:ext uri="{91240B29-F687-4f45-9708-019B960494DF}">
-                <a14:hiddenLine xmlns="" xmlns:a14="http://schemas.microsoft.com/office/drawing/2010/main" w="9525">
+                <a14:hiddenLine xmlns:a14="http://schemas.microsoft.com/office/drawing/2010/main" xmlns="" w="9525">
                   <a:solidFill>
                     <a:srgbClr val="000000"/>
                   </a:solidFill>
@@ -1470,7 +1469,7 @@
             </a:ln>
             <a:extLst>
               <a:ext uri="{91240B29-F687-4f45-9708-019B960494DF}">
-                <a14:hiddenLine xmlns="" xmlns:a14="http://schemas.microsoft.com/office/drawing/2010/main" w="9525">
+                <a14:hiddenLine xmlns:a14="http://schemas.microsoft.com/office/drawing/2010/main" xmlns="" w="9525">
                   <a:solidFill>
                     <a:srgbClr val="000000"/>
                   </a:solidFill>
@@ -1532,7 +1531,7 @@
             </a:ln>
             <a:extLst>
               <a:ext uri="{91240B29-F687-4f45-9708-019B960494DF}">
-                <a14:hiddenLine xmlns="" xmlns:a14="http://schemas.microsoft.com/office/drawing/2010/main" w="9525">
+                <a14:hiddenLine xmlns:a14="http://schemas.microsoft.com/office/drawing/2010/main" xmlns="" w="9525">
                   <a:solidFill>
                     <a:srgbClr val="000000"/>
                   </a:solidFill>
@@ -1622,7 +1621,7 @@
             </a:ln>
             <a:extLst>
               <a:ext uri="{91240B29-F687-4f45-9708-019B960494DF}">
-                <a14:hiddenLine xmlns="" xmlns:a14="http://schemas.microsoft.com/office/drawing/2010/main" w="9525">
+                <a14:hiddenLine xmlns:a14="http://schemas.microsoft.com/office/drawing/2010/main" xmlns="" w="9525">
                   <a:solidFill>
                     <a:srgbClr val="000000"/>
                   </a:solidFill>
@@ -1712,7 +1711,7 @@
             </a:ln>
             <a:extLst>
               <a:ext uri="{91240B29-F687-4f45-9708-019B960494DF}">
-                <a14:hiddenLine xmlns="" xmlns:a14="http://schemas.microsoft.com/office/drawing/2010/main" w="9525">
+                <a14:hiddenLine xmlns:a14="http://schemas.microsoft.com/office/drawing/2010/main" xmlns="" w="9525">
                   <a:solidFill>
                     <a:srgbClr val="000000"/>
                   </a:solidFill>
@@ -1768,7 +1767,7 @@
             </a:ln>
             <a:extLst>
               <a:ext uri="{91240B29-F687-4f45-9708-019B960494DF}">
-                <a14:hiddenLine xmlns="" xmlns:a14="http://schemas.microsoft.com/office/drawing/2010/main" w="9525">
+                <a14:hiddenLine xmlns:a14="http://schemas.microsoft.com/office/drawing/2010/main" xmlns="" w="9525">
                   <a:solidFill>
                     <a:srgbClr val="000000"/>
                   </a:solidFill>
@@ -1858,7 +1857,7 @@
             </a:ln>
             <a:extLst>
               <a:ext uri="{91240B29-F687-4f45-9708-019B960494DF}">
-                <a14:hiddenLine xmlns="" xmlns:a14="http://schemas.microsoft.com/office/drawing/2010/main" w="9525">
+                <a14:hiddenLine xmlns:a14="http://schemas.microsoft.com/office/drawing/2010/main" xmlns="" w="9525">
                   <a:solidFill>
                     <a:srgbClr val="000000"/>
                   </a:solidFill>
@@ -1914,7 +1913,7 @@
             </a:ln>
             <a:extLst>
               <a:ext uri="{91240B29-F687-4f45-9708-019B960494DF}">
-                <a14:hiddenLine xmlns="" xmlns:a14="http://schemas.microsoft.com/office/drawing/2010/main" w="9525">
+                <a14:hiddenLine xmlns:a14="http://schemas.microsoft.com/office/drawing/2010/main" xmlns="" w="9525">
                   <a:solidFill>
                     <a:srgbClr val="000000"/>
                   </a:solidFill>
@@ -2004,7 +2003,7 @@
             </a:ln>
             <a:extLst>
               <a:ext uri="{91240B29-F687-4f45-9708-019B960494DF}">
-                <a14:hiddenLine xmlns="" xmlns:a14="http://schemas.microsoft.com/office/drawing/2010/main" w="9525">
+                <a14:hiddenLine xmlns:a14="http://schemas.microsoft.com/office/drawing/2010/main" xmlns="" w="9525">
                   <a:solidFill>
                     <a:srgbClr val="000000"/>
                   </a:solidFill>
@@ -2072,7 +2071,7 @@
             </a:ln>
             <a:extLst>
               <a:ext uri="{91240B29-F687-4f45-9708-019B960494DF}">
-                <a14:hiddenLine xmlns="" xmlns:a14="http://schemas.microsoft.com/office/drawing/2010/main" w="9525">
+                <a14:hiddenLine xmlns:a14="http://schemas.microsoft.com/office/drawing/2010/main" xmlns="" w="9525">
                   <a:solidFill>
                     <a:srgbClr val="000000"/>
                   </a:solidFill>
@@ -2162,7 +2161,7 @@
             </a:ln>
             <a:extLst>
               <a:ext uri="{91240B29-F687-4f45-9708-019B960494DF}">
-                <a14:hiddenLine xmlns="" xmlns:a14="http://schemas.microsoft.com/office/drawing/2010/main" w="9525">
+                <a14:hiddenLine xmlns:a14="http://schemas.microsoft.com/office/drawing/2010/main" xmlns="" w="9525">
                   <a:solidFill>
                     <a:srgbClr val="000000"/>
                   </a:solidFill>
@@ -2230,7 +2229,7 @@
             </a:ln>
             <a:extLst>
               <a:ext uri="{91240B29-F687-4f45-9708-019B960494DF}">
-                <a14:hiddenLine xmlns="" xmlns:a14="http://schemas.microsoft.com/office/drawing/2010/main" w="9525">
+                <a14:hiddenLine xmlns:a14="http://schemas.microsoft.com/office/drawing/2010/main" xmlns="" w="9525">
                   <a:solidFill>
                     <a:srgbClr val="000000"/>
                   </a:solidFill>
@@ -2320,7 +2319,7 @@
             </a:ln>
             <a:extLst>
               <a:ext uri="{91240B29-F687-4f45-9708-019B960494DF}">
-                <a14:hiddenLine xmlns="" xmlns:a14="http://schemas.microsoft.com/office/drawing/2010/main" w="9525">
+                <a14:hiddenLine xmlns:a14="http://schemas.microsoft.com/office/drawing/2010/main" xmlns="" w="9525">
                   <a:solidFill>
                     <a:srgbClr val="000000"/>
                   </a:solidFill>
@@ -2354,7 +2353,7 @@
             </a:ln>
             <a:extLst>
               <a:ext uri="{91240B29-F687-4f45-9708-019B960494DF}">
-                <a14:hiddenLine xmlns="" xmlns:a14="http://schemas.microsoft.com/office/drawing/2010/main" w="9525">
+                <a14:hiddenLine xmlns:a14="http://schemas.microsoft.com/office/drawing/2010/main" xmlns="" w="9525">
                   <a:solidFill>
                     <a:srgbClr val="000000"/>
                   </a:solidFill>
@@ -2444,7 +2443,7 @@
             </a:ln>
             <a:extLst>
               <a:ext uri="{91240B29-F687-4f45-9708-019B960494DF}">
-                <a14:hiddenLine xmlns="" xmlns:a14="http://schemas.microsoft.com/office/drawing/2010/main" w="9525">
+                <a14:hiddenLine xmlns:a14="http://schemas.microsoft.com/office/drawing/2010/main" xmlns="" w="9525">
                   <a:solidFill>
                     <a:srgbClr val="000000"/>
                   </a:solidFill>
@@ -2506,7 +2505,7 @@
             </a:ln>
             <a:extLst>
               <a:ext uri="{91240B29-F687-4f45-9708-019B960494DF}">
-                <a14:hiddenLine xmlns="" xmlns:a14="http://schemas.microsoft.com/office/drawing/2010/main" w="9525">
+                <a14:hiddenLine xmlns:a14="http://schemas.microsoft.com/office/drawing/2010/main" xmlns="" w="9525">
                   <a:solidFill>
                     <a:srgbClr val="000000"/>
                   </a:solidFill>
@@ -2568,7 +2567,7 @@
             </a:ln>
             <a:extLst>
               <a:ext uri="{91240B29-F687-4f45-9708-019B960494DF}">
-                <a14:hiddenLine xmlns="" xmlns:a14="http://schemas.microsoft.com/office/drawing/2010/main" w="9525">
+                <a14:hiddenLine xmlns:a14="http://schemas.microsoft.com/office/drawing/2010/main" xmlns="" w="9525">
                   <a:solidFill>
                     <a:srgbClr val="000000"/>
                   </a:solidFill>
@@ -2658,7 +2657,7 @@
             </a:ln>
             <a:extLst>
               <a:ext uri="{91240B29-F687-4f45-9708-019B960494DF}">
-                <a14:hiddenLine xmlns="" xmlns:a14="http://schemas.microsoft.com/office/drawing/2010/main" w="9525">
+                <a14:hiddenLine xmlns:a14="http://schemas.microsoft.com/office/drawing/2010/main" xmlns="" w="9525">
                   <a:solidFill>
                     <a:srgbClr val="000000"/>
                   </a:solidFill>
@@ -2726,7 +2725,7 @@
             </a:ln>
             <a:extLst>
               <a:ext uri="{91240B29-F687-4f45-9708-019B960494DF}">
-                <a14:hiddenLine xmlns="" xmlns:a14="http://schemas.microsoft.com/office/drawing/2010/main" w="9525">
+                <a14:hiddenLine xmlns:a14="http://schemas.microsoft.com/office/drawing/2010/main" xmlns="" w="9525">
                   <a:solidFill>
                     <a:srgbClr val="000000"/>
                   </a:solidFill>
@@ -2788,7 +2787,7 @@
             </a:ln>
             <a:extLst>
               <a:ext uri="{91240B29-F687-4f45-9708-019B960494DF}">
-                <a14:hiddenLine xmlns="" xmlns:a14="http://schemas.microsoft.com/office/drawing/2010/main" w="9525">
+                <a14:hiddenLine xmlns:a14="http://schemas.microsoft.com/office/drawing/2010/main" xmlns="" w="9525">
                   <a:solidFill>
                     <a:srgbClr val="000000"/>
                   </a:solidFill>
@@ -2878,7 +2877,7 @@
             </a:ln>
             <a:extLst>
               <a:ext uri="{91240B29-F687-4f45-9708-019B960494DF}">
-                <a14:hiddenLine xmlns="" xmlns:a14="http://schemas.microsoft.com/office/drawing/2010/main" w="9525">
+                <a14:hiddenLine xmlns:a14="http://schemas.microsoft.com/office/drawing/2010/main" xmlns="" w="9525">
                   <a:solidFill>
                     <a:srgbClr val="000000"/>
                   </a:solidFill>
@@ -2940,7 +2939,7 @@
             </a:ln>
             <a:extLst>
               <a:ext uri="{91240B29-F687-4f45-9708-019B960494DF}">
-                <a14:hiddenLine xmlns="" xmlns:a14="http://schemas.microsoft.com/office/drawing/2010/main" w="9525">
+                <a14:hiddenLine xmlns:a14="http://schemas.microsoft.com/office/drawing/2010/main" xmlns="" w="9525">
                   <a:solidFill>
                     <a:srgbClr val="000000"/>
                   </a:solidFill>
@@ -3030,7 +3029,7 @@
             </a:ln>
             <a:extLst>
               <a:ext uri="{91240B29-F687-4f45-9708-019B960494DF}">
-                <a14:hiddenLine xmlns="" xmlns:a14="http://schemas.microsoft.com/office/drawing/2010/main" w="9525">
+                <a14:hiddenLine xmlns:a14="http://schemas.microsoft.com/office/drawing/2010/main" xmlns="" w="9525">
                   <a:solidFill>
                     <a:srgbClr val="000000"/>
                   </a:solidFill>
@@ -3092,7 +3091,7 @@
             </a:ln>
             <a:extLst>
               <a:ext uri="{91240B29-F687-4f45-9708-019B960494DF}">
-                <a14:hiddenLine xmlns="" xmlns:a14="http://schemas.microsoft.com/office/drawing/2010/main" w="9525">
+                <a14:hiddenLine xmlns:a14="http://schemas.microsoft.com/office/drawing/2010/main" xmlns="" w="9525">
                   <a:solidFill>
                     <a:srgbClr val="000000"/>
                   </a:solidFill>
@@ -3182,7 +3181,7 @@
             </a:ln>
             <a:extLst>
               <a:ext uri="{91240B29-F687-4f45-9708-019B960494DF}">
-                <a14:hiddenLine xmlns="" xmlns:a14="http://schemas.microsoft.com/office/drawing/2010/main" w="9525">
+                <a14:hiddenLine xmlns:a14="http://schemas.microsoft.com/office/drawing/2010/main" xmlns="" w="9525">
                   <a:solidFill>
                     <a:srgbClr val="000000"/>
                   </a:solidFill>
@@ -3216,7 +3215,7 @@
             </a:ln>
             <a:extLst>
               <a:ext uri="{91240B29-F687-4f45-9708-019B960494DF}">
-                <a14:hiddenLine xmlns="" xmlns:a14="http://schemas.microsoft.com/office/drawing/2010/main" w="9525">
+                <a14:hiddenLine xmlns:a14="http://schemas.microsoft.com/office/drawing/2010/main" xmlns="" w="9525">
                   <a:solidFill>
                     <a:srgbClr val="000000"/>
                   </a:solidFill>
@@ -3281,7 +3280,7 @@
             </a:ln>
             <a:extLst>
               <a:ext uri="{91240B29-F687-4f45-9708-019B960494DF}">
-                <a14:hiddenLine xmlns="" xmlns:a14="http://schemas.microsoft.com/office/drawing/2010/main" w="9525">
+                <a14:hiddenLine xmlns:a14="http://schemas.microsoft.com/office/drawing/2010/main" xmlns="" w="9525">
                   <a:solidFill>
                     <a:srgbClr val="000000"/>
                   </a:solidFill>
@@ -3371,7 +3370,7 @@
             </a:ln>
             <a:extLst>
               <a:ext uri="{91240B29-F687-4f45-9708-019B960494DF}">
-                <a14:hiddenLine xmlns="" xmlns:a14="http://schemas.microsoft.com/office/drawing/2010/main" w="9525">
+                <a14:hiddenLine xmlns:a14="http://schemas.microsoft.com/office/drawing/2010/main" xmlns="" w="9525">
                   <a:solidFill>
                     <a:srgbClr val="000000"/>
                   </a:solidFill>
@@ -3433,7 +3432,7 @@
             </a:ln>
             <a:extLst>
               <a:ext uri="{91240B29-F687-4f45-9708-019B960494DF}">
-                <a14:hiddenLine xmlns="" xmlns:a14="http://schemas.microsoft.com/office/drawing/2010/main" w="9525">
+                <a14:hiddenLine xmlns:a14="http://schemas.microsoft.com/office/drawing/2010/main" xmlns="" w="9525">
                   <a:solidFill>
                     <a:srgbClr val="000000"/>
                   </a:solidFill>
@@ -3523,7 +3522,7 @@
             </a:ln>
             <a:extLst>
               <a:ext uri="{91240B29-F687-4f45-9708-019B960494DF}">
-                <a14:hiddenLine xmlns="" xmlns:a14="http://schemas.microsoft.com/office/drawing/2010/main" w="9525">
+                <a14:hiddenLine xmlns:a14="http://schemas.microsoft.com/office/drawing/2010/main" xmlns="" w="9525">
                   <a:solidFill>
                     <a:srgbClr val="000000"/>
                   </a:solidFill>
@@ -3613,7 +3612,7 @@
             </a:ln>
             <a:extLst>
               <a:ext uri="{91240B29-F687-4f45-9708-019B960494DF}">
-                <a14:hiddenLine xmlns="" xmlns:a14="http://schemas.microsoft.com/office/drawing/2010/main" w="9525">
+                <a14:hiddenLine xmlns:a14="http://schemas.microsoft.com/office/drawing/2010/main" xmlns="" w="9525">
                   <a:solidFill>
                     <a:srgbClr val="000000"/>
                   </a:solidFill>
@@ -3678,7 +3677,7 @@
             </a:ln>
             <a:extLst>
               <a:ext uri="{91240B29-F687-4f45-9708-019B960494DF}">
-                <a14:hiddenLine xmlns="" xmlns:a14="http://schemas.microsoft.com/office/drawing/2010/main" w="9525">
+                <a14:hiddenLine xmlns:a14="http://schemas.microsoft.com/office/drawing/2010/main" xmlns="" w="9525">
                   <a:solidFill>
                     <a:srgbClr val="000000"/>
                   </a:solidFill>
@@ -3740,7 +3739,7 @@
             </a:ln>
             <a:extLst>
               <a:ext uri="{91240B29-F687-4f45-9708-019B960494DF}">
-                <a14:hiddenLine xmlns="" xmlns:a14="http://schemas.microsoft.com/office/drawing/2010/main" w="9525">
+                <a14:hiddenLine xmlns:a14="http://schemas.microsoft.com/office/drawing/2010/main" xmlns="" w="9525">
                   <a:solidFill>
                     <a:srgbClr val="000000"/>
                   </a:solidFill>
@@ -3830,7 +3829,7 @@
             </a:ln>
             <a:extLst>
               <a:ext uri="{91240B29-F687-4f45-9708-019B960494DF}">
-                <a14:hiddenLine xmlns="" xmlns:a14="http://schemas.microsoft.com/office/drawing/2010/main" w="9525">
+                <a14:hiddenLine xmlns:a14="http://schemas.microsoft.com/office/drawing/2010/main" xmlns="" w="9525">
                   <a:solidFill>
                     <a:srgbClr val="000000"/>
                   </a:solidFill>
@@ -3920,7 +3919,7 @@
             </a:ln>
             <a:extLst>
               <a:ext uri="{91240B29-F687-4f45-9708-019B960494DF}">
-                <a14:hiddenLine xmlns="" xmlns:a14="http://schemas.microsoft.com/office/drawing/2010/main" w="9525">
+                <a14:hiddenLine xmlns:a14="http://schemas.microsoft.com/office/drawing/2010/main" xmlns="" w="9525">
                   <a:solidFill>
                     <a:srgbClr val="000000"/>
                   </a:solidFill>
@@ -3982,7 +3981,7 @@
             </a:ln>
             <a:extLst>
               <a:ext uri="{91240B29-F687-4f45-9708-019B960494DF}">
-                <a14:hiddenLine xmlns="" xmlns:a14="http://schemas.microsoft.com/office/drawing/2010/main" w="9525">
+                <a14:hiddenLine xmlns:a14="http://schemas.microsoft.com/office/drawing/2010/main" xmlns="" w="9525">
                   <a:solidFill>
                     <a:srgbClr val="000000"/>
                   </a:solidFill>
@@ -4102,7 +4101,7 @@
             </a:ln>
             <a:extLst>
               <a:ext uri="{91240B29-F687-4f45-9708-019B960494DF}">
-                <a14:hiddenLine xmlns="" xmlns:a14="http://schemas.microsoft.com/office/drawing/2010/main" w="9525">
+                <a14:hiddenLine xmlns:a14="http://schemas.microsoft.com/office/drawing/2010/main" xmlns="" w="9525">
                   <a:solidFill>
                     <a:srgbClr val="000000"/>
                   </a:solidFill>
@@ -4170,7 +4169,7 @@
             </a:ln>
             <a:extLst>
               <a:ext uri="{91240B29-F687-4f45-9708-019B960494DF}">
-                <a14:hiddenLine xmlns="" xmlns:a14="http://schemas.microsoft.com/office/drawing/2010/main" w="9525">
+                <a14:hiddenLine xmlns:a14="http://schemas.microsoft.com/office/drawing/2010/main" xmlns="" w="9525">
                   <a:solidFill>
                     <a:srgbClr val="000000"/>
                   </a:solidFill>
@@ -4260,7 +4259,7 @@
             </a:ln>
             <a:extLst>
               <a:ext uri="{91240B29-F687-4f45-9708-019B960494DF}">
-                <a14:hiddenLine xmlns="" xmlns:a14="http://schemas.microsoft.com/office/drawing/2010/main" w="9525">
+                <a14:hiddenLine xmlns:a14="http://schemas.microsoft.com/office/drawing/2010/main" xmlns="" w="9525">
                   <a:solidFill>
                     <a:srgbClr val="000000"/>
                   </a:solidFill>
@@ -4400,7 +4399,7 @@
           <a:p>
             <a:fld id="{5969946C-D33D-4FE7-A308-266207BA8A2A}" type="datetimeFigureOut">
               <a:rPr lang="en-CA" smtClean="0"/>
-              <a:t>2018-03-14</a:t>
+              <a:t>2018-03-15</a:t>
             </a:fld>
             <a:endParaRPr lang="en-CA"/>
           </a:p>
@@ -4667,7 +4666,7 @@
           <a:p>
             <a:fld id="{5969946C-D33D-4FE7-A308-266207BA8A2A}" type="datetimeFigureOut">
               <a:rPr lang="en-CA" smtClean="0"/>
-              <a:t>2018-03-14</a:t>
+              <a:t>2018-03-15</a:t>
             </a:fld>
             <a:endParaRPr lang="en-CA"/>
           </a:p>
@@ -4863,7 +4862,7 @@
           <a:p>
             <a:fld id="{5969946C-D33D-4FE7-A308-266207BA8A2A}" type="datetimeFigureOut">
               <a:rPr lang="en-CA" smtClean="0"/>
-              <a:t>2018-03-14</a:t>
+              <a:t>2018-03-15</a:t>
             </a:fld>
             <a:endParaRPr lang="en-CA"/>
           </a:p>
@@ -5126,7 +5125,7 @@
           <a:p>
             <a:fld id="{5969946C-D33D-4FE7-A308-266207BA8A2A}" type="datetimeFigureOut">
               <a:rPr lang="en-CA" smtClean="0"/>
-              <a:t>2018-03-14</a:t>
+              <a:t>2018-03-15</a:t>
             </a:fld>
             <a:endParaRPr lang="en-CA"/>
           </a:p>
@@ -5560,7 +5559,7 @@
           <a:p>
             <a:fld id="{5969946C-D33D-4FE7-A308-266207BA8A2A}" type="datetimeFigureOut">
               <a:rPr lang="en-CA" smtClean="0"/>
-              <a:t>2018-03-14</a:t>
+              <a:t>2018-03-15</a:t>
             </a:fld>
             <a:endParaRPr lang="en-CA"/>
           </a:p>
@@ -6106,7 +6105,7 @@
           <a:p>
             <a:fld id="{5969946C-D33D-4FE7-A308-266207BA8A2A}" type="datetimeFigureOut">
               <a:rPr lang="en-CA" smtClean="0"/>
-              <a:t>2018-03-14</a:t>
+              <a:t>2018-03-15</a:t>
             </a:fld>
             <a:endParaRPr lang="en-CA"/>
           </a:p>
@@ -6826,7 +6825,7 @@
           <a:p>
             <a:fld id="{5969946C-D33D-4FE7-A308-266207BA8A2A}" type="datetimeFigureOut">
               <a:rPr lang="en-CA" smtClean="0"/>
-              <a:t>2018-03-14</a:t>
+              <a:t>2018-03-15</a:t>
             </a:fld>
             <a:endParaRPr lang="en-CA"/>
           </a:p>
@@ -6996,7 +6995,7 @@
           <a:p>
             <a:fld id="{5969946C-D33D-4FE7-A308-266207BA8A2A}" type="datetimeFigureOut">
               <a:rPr lang="en-CA" smtClean="0"/>
-              <a:t>2018-03-14</a:t>
+              <a:t>2018-03-15</a:t>
             </a:fld>
             <a:endParaRPr lang="en-CA"/>
           </a:p>
@@ -7176,7 +7175,7 @@
           <a:p>
             <a:fld id="{5969946C-D33D-4FE7-A308-266207BA8A2A}" type="datetimeFigureOut">
               <a:rPr lang="en-CA" smtClean="0"/>
-              <a:t>2018-03-14</a:t>
+              <a:t>2018-03-15</a:t>
             </a:fld>
             <a:endParaRPr lang="en-CA"/>
           </a:p>
@@ -7346,7 +7345,7 @@
           <a:p>
             <a:fld id="{5969946C-D33D-4FE7-A308-266207BA8A2A}" type="datetimeFigureOut">
               <a:rPr lang="en-CA" smtClean="0"/>
-              <a:t>2018-03-14</a:t>
+              <a:t>2018-03-15</a:t>
             </a:fld>
             <a:endParaRPr lang="en-CA"/>
           </a:p>
@@ -7596,7 +7595,7 @@
           <a:p>
             <a:fld id="{5969946C-D33D-4FE7-A308-266207BA8A2A}" type="datetimeFigureOut">
               <a:rPr lang="en-CA" smtClean="0"/>
-              <a:t>2018-03-14</a:t>
+              <a:t>2018-03-15</a:t>
             </a:fld>
             <a:endParaRPr lang="en-CA"/>
           </a:p>
@@ -7828,7 +7827,7 @@
           <a:p>
             <a:fld id="{5969946C-D33D-4FE7-A308-266207BA8A2A}" type="datetimeFigureOut">
               <a:rPr lang="en-CA" smtClean="0"/>
-              <a:t>2018-03-14</a:t>
+              <a:t>2018-03-15</a:t>
             </a:fld>
             <a:endParaRPr lang="en-CA"/>
           </a:p>
@@ -8209,7 +8208,7 @@
           <a:p>
             <a:fld id="{5969946C-D33D-4FE7-A308-266207BA8A2A}" type="datetimeFigureOut">
               <a:rPr lang="en-CA" smtClean="0"/>
-              <a:t>2018-03-14</a:t>
+              <a:t>2018-03-15</a:t>
             </a:fld>
             <a:endParaRPr lang="en-CA"/>
           </a:p>
@@ -8327,7 +8326,7 @@
           <a:p>
             <a:fld id="{5969946C-D33D-4FE7-A308-266207BA8A2A}" type="datetimeFigureOut">
               <a:rPr lang="en-CA" smtClean="0"/>
-              <a:t>2018-03-14</a:t>
+              <a:t>2018-03-15</a:t>
             </a:fld>
             <a:endParaRPr lang="en-CA"/>
           </a:p>
@@ -8422,7 +8421,7 @@
           <a:p>
             <a:fld id="{5969946C-D33D-4FE7-A308-266207BA8A2A}" type="datetimeFigureOut">
               <a:rPr lang="en-CA" smtClean="0"/>
-              <a:t>2018-03-14</a:t>
+              <a:t>2018-03-15</a:t>
             </a:fld>
             <a:endParaRPr lang="en-CA"/>
           </a:p>
@@ -8671,7 +8670,7 @@
           <a:p>
             <a:fld id="{5969946C-D33D-4FE7-A308-266207BA8A2A}" type="datetimeFigureOut">
               <a:rPr lang="en-CA" smtClean="0"/>
-              <a:t>2018-03-14</a:t>
+              <a:t>2018-03-15</a:t>
             </a:fld>
             <a:endParaRPr lang="en-CA"/>
           </a:p>
@@ -8951,7 +8950,7 @@
           <a:p>
             <a:fld id="{5969946C-D33D-4FE7-A308-266207BA8A2A}" type="datetimeFigureOut">
               <a:rPr lang="en-CA" smtClean="0"/>
-              <a:t>2018-03-14</a:t>
+              <a:t>2018-03-15</a:t>
             </a:fld>
             <a:endParaRPr lang="en-CA"/>
           </a:p>
@@ -9067,7 +9066,7 @@
           <a:noFill/>
           <a:extLst>
             <a:ext uri="{909E8E84-426E-40dd-AFC4-6F175D3DCCD1}">
-              <a14:hiddenFill xmlns="" xmlns:a14="http://schemas.microsoft.com/office/drawing/2010/main">
+              <a14:hiddenFill xmlns:a14="http://schemas.microsoft.com/office/drawing/2010/main" xmlns="">
                 <a:solidFill>
                   <a:srgbClr val="FFFFFF"/>
                 </a:solidFill>
@@ -9141,7 +9140,7 @@
               </a:ln>
               <a:extLst>
                 <a:ext uri="{91240B29-F687-4f45-9708-019B960494DF}">
-                  <a14:hiddenLine xmlns="" xmlns:a14="http://schemas.microsoft.com/office/drawing/2010/main" w="9525">
+                  <a14:hiddenLine xmlns:a14="http://schemas.microsoft.com/office/drawing/2010/main" xmlns="" w="9525">
                     <a:solidFill>
                       <a:srgbClr val="000000"/>
                     </a:solidFill>
@@ -9231,7 +9230,7 @@
               </a:ln>
               <a:extLst>
                 <a:ext uri="{91240B29-F687-4f45-9708-019B960494DF}">
-                  <a14:hiddenLine xmlns="" xmlns:a14="http://schemas.microsoft.com/office/drawing/2010/main" w="9525">
+                  <a14:hiddenLine xmlns:a14="http://schemas.microsoft.com/office/drawing/2010/main" xmlns="" w="9525">
                     <a:solidFill>
                       <a:srgbClr val="000000"/>
                     </a:solidFill>
@@ -9321,7 +9320,7 @@
               </a:ln>
               <a:extLst>
                 <a:ext uri="{91240B29-F687-4f45-9708-019B960494DF}">
-                  <a14:hiddenLine xmlns="" xmlns:a14="http://schemas.microsoft.com/office/drawing/2010/main" w="9525">
+                  <a14:hiddenLine xmlns:a14="http://schemas.microsoft.com/office/drawing/2010/main" xmlns="" w="9525">
                     <a:solidFill>
                       <a:srgbClr val="000000"/>
                     </a:solidFill>
@@ -9383,7 +9382,7 @@
               </a:ln>
               <a:extLst>
                 <a:ext uri="{91240B29-F687-4f45-9708-019B960494DF}">
-                  <a14:hiddenLine xmlns="" xmlns:a14="http://schemas.microsoft.com/office/drawing/2010/main" w="9525">
+                  <a14:hiddenLine xmlns:a14="http://schemas.microsoft.com/office/drawing/2010/main" xmlns="" w="9525">
                     <a:solidFill>
                       <a:srgbClr val="000000"/>
                     </a:solidFill>
@@ -9473,7 +9472,7 @@
               </a:ln>
               <a:extLst>
                 <a:ext uri="{91240B29-F687-4f45-9708-019B960494DF}">
-                  <a14:hiddenLine xmlns="" xmlns:a14="http://schemas.microsoft.com/office/drawing/2010/main" w="9525">
+                  <a14:hiddenLine xmlns:a14="http://schemas.microsoft.com/office/drawing/2010/main" xmlns="" w="9525">
                     <a:solidFill>
                       <a:srgbClr val="000000"/>
                     </a:solidFill>
@@ -9535,7 +9534,7 @@
               </a:ln>
               <a:extLst>
                 <a:ext uri="{91240B29-F687-4f45-9708-019B960494DF}">
-                  <a14:hiddenLine xmlns="" xmlns:a14="http://schemas.microsoft.com/office/drawing/2010/main" w="9525">
+                  <a14:hiddenLine xmlns:a14="http://schemas.microsoft.com/office/drawing/2010/main" xmlns="" w="9525">
                     <a:solidFill>
                       <a:srgbClr val="000000"/>
                     </a:solidFill>
@@ -9597,7 +9596,7 @@
               </a:ln>
               <a:extLst>
                 <a:ext uri="{91240B29-F687-4f45-9708-019B960494DF}">
-                  <a14:hiddenLine xmlns="" xmlns:a14="http://schemas.microsoft.com/office/drawing/2010/main" w="9525">
+                  <a14:hiddenLine xmlns:a14="http://schemas.microsoft.com/office/drawing/2010/main" xmlns="" w="9525">
                     <a:solidFill>
                       <a:srgbClr val="000000"/>
                     </a:solidFill>
@@ -9687,7 +9686,7 @@
               </a:ln>
               <a:extLst>
                 <a:ext uri="{91240B29-F687-4f45-9708-019B960494DF}">
-                  <a14:hiddenLine xmlns="" xmlns:a14="http://schemas.microsoft.com/office/drawing/2010/main" w="9525">
+                  <a14:hiddenLine xmlns:a14="http://schemas.microsoft.com/office/drawing/2010/main" xmlns="" w="9525">
                     <a:solidFill>
                       <a:srgbClr val="000000"/>
                     </a:solidFill>
@@ -9777,7 +9776,7 @@
               </a:ln>
               <a:extLst>
                 <a:ext uri="{91240B29-F687-4f45-9708-019B960494DF}">
-                  <a14:hiddenLine xmlns="" xmlns:a14="http://schemas.microsoft.com/office/drawing/2010/main" w="9525">
+                  <a14:hiddenLine xmlns:a14="http://schemas.microsoft.com/office/drawing/2010/main" xmlns="" w="9525">
                     <a:solidFill>
                       <a:srgbClr val="000000"/>
                     </a:solidFill>
@@ -9839,7 +9838,7 @@
               </a:ln>
               <a:extLst>
                 <a:ext uri="{91240B29-F687-4f45-9708-019B960494DF}">
-                  <a14:hiddenLine xmlns="" xmlns:a14="http://schemas.microsoft.com/office/drawing/2010/main" w="9525">
+                  <a14:hiddenLine xmlns:a14="http://schemas.microsoft.com/office/drawing/2010/main" xmlns="" w="9525">
                     <a:solidFill>
                       <a:srgbClr val="000000"/>
                     </a:solidFill>
@@ -9949,7 +9948,7 @@
               </a:ln>
               <a:extLst>
                 <a:ext uri="{91240B29-F687-4f45-9708-019B960494DF}">
-                  <a14:hiddenLine xmlns="" xmlns:a14="http://schemas.microsoft.com/office/drawing/2010/main" w="9525">
+                  <a14:hiddenLine xmlns:a14="http://schemas.microsoft.com/office/drawing/2010/main" xmlns="" w="9525">
                     <a:solidFill>
                       <a:srgbClr val="000000"/>
                     </a:solidFill>
@@ -10033,7 +10032,7 @@
               </a:ln>
               <a:extLst>
                 <a:ext uri="{91240B29-F687-4f45-9708-019B960494DF}">
-                  <a14:hiddenLine xmlns="" xmlns:a14="http://schemas.microsoft.com/office/drawing/2010/main" w="9525">
+                  <a14:hiddenLine xmlns:a14="http://schemas.microsoft.com/office/drawing/2010/main" xmlns="" w="9525">
                     <a:solidFill>
                       <a:srgbClr val="000000"/>
                     </a:solidFill>
@@ -10095,7 +10094,7 @@
               </a:ln>
               <a:extLst>
                 <a:ext uri="{91240B29-F687-4f45-9708-019B960494DF}">
-                  <a14:hiddenLine xmlns="" xmlns:a14="http://schemas.microsoft.com/office/drawing/2010/main" w="9525">
+                  <a14:hiddenLine xmlns:a14="http://schemas.microsoft.com/office/drawing/2010/main" xmlns="" w="9525">
                     <a:solidFill>
                       <a:srgbClr val="000000"/>
                     </a:solidFill>
@@ -10157,7 +10156,7 @@
               </a:ln>
               <a:extLst>
                 <a:ext uri="{91240B29-F687-4f45-9708-019B960494DF}">
-                  <a14:hiddenLine xmlns="" xmlns:a14="http://schemas.microsoft.com/office/drawing/2010/main" w="9525">
+                  <a14:hiddenLine xmlns:a14="http://schemas.microsoft.com/office/drawing/2010/main" xmlns="" w="9525">
                     <a:solidFill>
                       <a:srgbClr val="000000"/>
                     </a:solidFill>
@@ -10247,7 +10246,7 @@
               </a:ln>
               <a:extLst>
                 <a:ext uri="{91240B29-F687-4f45-9708-019B960494DF}">
-                  <a14:hiddenLine xmlns="" xmlns:a14="http://schemas.microsoft.com/office/drawing/2010/main" w="9525">
+                  <a14:hiddenLine xmlns:a14="http://schemas.microsoft.com/office/drawing/2010/main" xmlns="" w="9525">
                     <a:solidFill>
                       <a:srgbClr val="000000"/>
                     </a:solidFill>
@@ -10281,7 +10280,7 @@
               </a:ln>
               <a:extLst>
                 <a:ext uri="{91240B29-F687-4f45-9708-019B960494DF}">
-                  <a14:hiddenLine xmlns="" xmlns:a14="http://schemas.microsoft.com/office/drawing/2010/main" w="9525">
+                  <a14:hiddenLine xmlns:a14="http://schemas.microsoft.com/office/drawing/2010/main" xmlns="" w="9525">
                     <a:solidFill>
                       <a:srgbClr val="000000"/>
                     </a:solidFill>
@@ -10346,7 +10345,7 @@
               </a:ln>
               <a:extLst>
                 <a:ext uri="{91240B29-F687-4f45-9708-019B960494DF}">
-                  <a14:hiddenLine xmlns="" xmlns:a14="http://schemas.microsoft.com/office/drawing/2010/main" w="9525">
+                  <a14:hiddenLine xmlns:a14="http://schemas.microsoft.com/office/drawing/2010/main" xmlns="" w="9525">
                     <a:solidFill>
                       <a:srgbClr val="000000"/>
                     </a:solidFill>
@@ -10436,7 +10435,7 @@
               </a:ln>
               <a:extLst>
                 <a:ext uri="{91240B29-F687-4f45-9708-019B960494DF}">
-                  <a14:hiddenLine xmlns="" xmlns:a14="http://schemas.microsoft.com/office/drawing/2010/main" w="9525">
+                  <a14:hiddenLine xmlns:a14="http://schemas.microsoft.com/office/drawing/2010/main" xmlns="" w="9525">
                     <a:solidFill>
                       <a:srgbClr val="000000"/>
                     </a:solidFill>
@@ -10498,7 +10497,7 @@
               </a:ln>
               <a:extLst>
                 <a:ext uri="{91240B29-F687-4f45-9708-019B960494DF}">
-                  <a14:hiddenLine xmlns="" xmlns:a14="http://schemas.microsoft.com/office/drawing/2010/main" w="9525">
+                  <a14:hiddenLine xmlns:a14="http://schemas.microsoft.com/office/drawing/2010/main" xmlns="" w="9525">
                     <a:solidFill>
                       <a:srgbClr val="000000"/>
                     </a:solidFill>
@@ -10588,7 +10587,7 @@
               </a:ln>
               <a:extLst>
                 <a:ext uri="{91240B29-F687-4f45-9708-019B960494DF}">
-                  <a14:hiddenLine xmlns="" xmlns:a14="http://schemas.microsoft.com/office/drawing/2010/main" w="9525">
+                  <a14:hiddenLine xmlns:a14="http://schemas.microsoft.com/office/drawing/2010/main" xmlns="" w="9525">
                     <a:solidFill>
                       <a:srgbClr val="000000"/>
                     </a:solidFill>
@@ -10653,7 +10652,7 @@
               </a:ln>
               <a:extLst>
                 <a:ext uri="{91240B29-F687-4f45-9708-019B960494DF}">
-                  <a14:hiddenLine xmlns="" xmlns:a14="http://schemas.microsoft.com/office/drawing/2010/main" w="9525">
+                  <a14:hiddenLine xmlns:a14="http://schemas.microsoft.com/office/drawing/2010/main" xmlns="" w="9525">
                     <a:solidFill>
                       <a:srgbClr val="000000"/>
                     </a:solidFill>
@@ -10715,7 +10714,7 @@
               </a:ln>
               <a:extLst>
                 <a:ext uri="{91240B29-F687-4f45-9708-019B960494DF}">
-                  <a14:hiddenLine xmlns="" xmlns:a14="http://schemas.microsoft.com/office/drawing/2010/main" w="9525">
+                  <a14:hiddenLine xmlns:a14="http://schemas.microsoft.com/office/drawing/2010/main" xmlns="" w="9525">
                     <a:solidFill>
                       <a:srgbClr val="000000"/>
                     </a:solidFill>
@@ -10805,7 +10804,7 @@
               </a:ln>
               <a:extLst>
                 <a:ext uri="{91240B29-F687-4f45-9708-019B960494DF}">
-                  <a14:hiddenLine xmlns="" xmlns:a14="http://schemas.microsoft.com/office/drawing/2010/main" w="9525">
+                  <a14:hiddenLine xmlns:a14="http://schemas.microsoft.com/office/drawing/2010/main" xmlns="" w="9525">
                     <a:solidFill>
                       <a:srgbClr val="000000"/>
                     </a:solidFill>
@@ -10895,7 +10894,7 @@
               </a:ln>
               <a:extLst>
                 <a:ext uri="{91240B29-F687-4f45-9708-019B960494DF}">
-                  <a14:hiddenLine xmlns="" xmlns:a14="http://schemas.microsoft.com/office/drawing/2010/main" w="9525">
+                  <a14:hiddenLine xmlns:a14="http://schemas.microsoft.com/office/drawing/2010/main" xmlns="" w="9525">
                     <a:solidFill>
                       <a:srgbClr val="000000"/>
                     </a:solidFill>
@@ -10960,7 +10959,7 @@
               </a:ln>
               <a:extLst>
                 <a:ext uri="{91240B29-F687-4f45-9708-019B960494DF}">
-                  <a14:hiddenLine xmlns="" xmlns:a14="http://schemas.microsoft.com/office/drawing/2010/main" w="9525">
+                  <a14:hiddenLine xmlns:a14="http://schemas.microsoft.com/office/drawing/2010/main" xmlns="" w="9525">
                     <a:solidFill>
                       <a:srgbClr val="000000"/>
                     </a:solidFill>
@@ -11080,7 +11079,7 @@
               </a:ln>
               <a:extLst>
                 <a:ext uri="{91240B29-F687-4f45-9708-019B960494DF}">
-                  <a14:hiddenLine xmlns="" xmlns:a14="http://schemas.microsoft.com/office/drawing/2010/main" w="9525">
+                  <a14:hiddenLine xmlns:a14="http://schemas.microsoft.com/office/drawing/2010/main" xmlns="" w="9525">
                     <a:solidFill>
                       <a:srgbClr val="000000"/>
                     </a:solidFill>
@@ -11178,7 +11177,7 @@
               </a:ln>
               <a:extLst>
                 <a:ext uri="{91240B29-F687-4f45-9708-019B960494DF}">
-                  <a14:hiddenLine xmlns="" xmlns:a14="http://schemas.microsoft.com/office/drawing/2010/main" w="9525">
+                  <a14:hiddenLine xmlns:a14="http://schemas.microsoft.com/office/drawing/2010/main" xmlns="" w="9525">
                     <a:solidFill>
                       <a:srgbClr val="000000"/>
                     </a:solidFill>
@@ -11293,7 +11292,7 @@
               </a:ln>
               <a:extLst>
                 <a:ext uri="{91240B29-F687-4f45-9708-019B960494DF}">
-                  <a14:hiddenLine xmlns="" xmlns:a14="http://schemas.microsoft.com/office/drawing/2010/main" w="9525">
+                  <a14:hiddenLine xmlns:a14="http://schemas.microsoft.com/office/drawing/2010/main" xmlns="" w="9525">
                     <a:solidFill>
                       <a:srgbClr val="000000"/>
                     </a:solidFill>
@@ -11383,7 +11382,7 @@
               </a:ln>
               <a:extLst>
                 <a:ext uri="{91240B29-F687-4f45-9708-019B960494DF}">
-                  <a14:hiddenLine xmlns="" xmlns:a14="http://schemas.microsoft.com/office/drawing/2010/main" w="9525">
+                  <a14:hiddenLine xmlns:a14="http://schemas.microsoft.com/office/drawing/2010/main" xmlns="" w="9525">
                     <a:solidFill>
                       <a:srgbClr val="000000"/>
                     </a:solidFill>
@@ -11448,7 +11447,7 @@
               </a:ln>
               <a:extLst>
                 <a:ext uri="{91240B29-F687-4f45-9708-019B960494DF}">
-                  <a14:hiddenLine xmlns="" xmlns:a14="http://schemas.microsoft.com/office/drawing/2010/main" w="9525">
+                  <a14:hiddenLine xmlns:a14="http://schemas.microsoft.com/office/drawing/2010/main" xmlns="" w="9525">
                     <a:solidFill>
                       <a:srgbClr val="000000"/>
                     </a:solidFill>
@@ -11538,7 +11537,7 @@
               </a:ln>
               <a:extLst>
                 <a:ext uri="{91240B29-F687-4f45-9708-019B960494DF}">
-                  <a14:hiddenLine xmlns="" xmlns:a14="http://schemas.microsoft.com/office/drawing/2010/main" w="9525">
+                  <a14:hiddenLine xmlns:a14="http://schemas.microsoft.com/office/drawing/2010/main" xmlns="" w="9525">
                     <a:solidFill>
                       <a:srgbClr val="000000"/>
                     </a:solidFill>
@@ -11606,7 +11605,7 @@
               </a:ln>
               <a:extLst>
                 <a:ext uri="{91240B29-F687-4f45-9708-019B960494DF}">
-                  <a14:hiddenLine xmlns="" xmlns:a14="http://schemas.microsoft.com/office/drawing/2010/main" w="9525">
+                  <a14:hiddenLine xmlns:a14="http://schemas.microsoft.com/office/drawing/2010/main" xmlns="" w="9525">
                     <a:solidFill>
                       <a:srgbClr val="000000"/>
                     </a:solidFill>
@@ -11696,7 +11695,7 @@
               </a:ln>
               <a:extLst>
                 <a:ext uri="{91240B29-F687-4f45-9708-019B960494DF}">
-                  <a14:hiddenLine xmlns="" xmlns:a14="http://schemas.microsoft.com/office/drawing/2010/main" w="9525">
+                  <a14:hiddenLine xmlns:a14="http://schemas.microsoft.com/office/drawing/2010/main" xmlns="" w="9525">
                     <a:solidFill>
                       <a:srgbClr val="000000"/>
                     </a:solidFill>
@@ -11764,7 +11763,7 @@
               </a:ln>
               <a:extLst>
                 <a:ext uri="{91240B29-F687-4f45-9708-019B960494DF}">
-                  <a14:hiddenLine xmlns="" xmlns:a14="http://schemas.microsoft.com/office/drawing/2010/main" w="9525">
+                  <a14:hiddenLine xmlns:a14="http://schemas.microsoft.com/office/drawing/2010/main" xmlns="" w="9525">
                     <a:solidFill>
                       <a:srgbClr val="000000"/>
                     </a:solidFill>
@@ -11854,7 +11853,7 @@
               </a:ln>
               <a:extLst>
                 <a:ext uri="{91240B29-F687-4f45-9708-019B960494DF}">
-                  <a14:hiddenLine xmlns="" xmlns:a14="http://schemas.microsoft.com/office/drawing/2010/main" w="9525">
+                  <a14:hiddenLine xmlns:a14="http://schemas.microsoft.com/office/drawing/2010/main" xmlns="" w="9525">
                     <a:solidFill>
                       <a:srgbClr val="000000"/>
                     </a:solidFill>
@@ -11888,7 +11887,7 @@
               </a:ln>
               <a:extLst>
                 <a:ext uri="{91240B29-F687-4f45-9708-019B960494DF}">
-                  <a14:hiddenLine xmlns="" xmlns:a14="http://schemas.microsoft.com/office/drawing/2010/main" w="9525">
+                  <a14:hiddenLine xmlns:a14="http://schemas.microsoft.com/office/drawing/2010/main" xmlns="" w="9525">
                     <a:solidFill>
                       <a:srgbClr val="000000"/>
                     </a:solidFill>
@@ -12028,7 +12027,7 @@
           <a:p>
             <a:fld id="{5969946C-D33D-4FE7-A308-266207BA8A2A}" type="datetimeFigureOut">
               <a:rPr lang="en-CA" smtClean="0"/>
-              <a:t>2018-03-14</a:t>
+              <a:t>2018-03-15</a:t>
             </a:fld>
             <a:endParaRPr lang="en-CA"/>
           </a:p>
@@ -12582,89 +12581,6 @@
           <p:cNvPr id="2" name="Title 1">
             <a:extLst>
               <a:ext uri="{FF2B5EF4-FFF2-40B4-BE49-F238E27FC236}">
-                <a16:creationId xmlns:a16="http://schemas.microsoft.com/office/drawing/2014/main" id="{9E742767-FEFC-48D4-8E9E-C81F2D5353EC}"/>
-              </a:ext>
-            </a:extLst>
-          </p:cNvPr>
-          <p:cNvSpPr>
-            <a:spLocks noGrp="1"/>
-          </p:cNvSpPr>
-          <p:nvPr>
-            <p:ph type="title"/>
-          </p:nvPr>
-        </p:nvSpPr>
-        <p:spPr/>
-        <p:txBody>
-          <a:bodyPr/>
-          <a:lstStyle/>
-          <a:p>
-            <a:r>
-              <a:rPr lang="en-CA" dirty="0"/>
-              <a:t>Interface screen shots</a:t>
-            </a:r>
-          </a:p>
-        </p:txBody>
-      </p:sp>
-      <p:sp>
-        <p:nvSpPr>
-          <p:cNvPr id="3" name="Content Placeholder 2">
-            <a:extLst>
-              <a:ext uri="{FF2B5EF4-FFF2-40B4-BE49-F238E27FC236}">
-                <a16:creationId xmlns:a16="http://schemas.microsoft.com/office/drawing/2014/main" id="{D903C284-F3CE-48D4-99B0-B3E2EFCE1D9A}"/>
-              </a:ext>
-            </a:extLst>
-          </p:cNvPr>
-          <p:cNvSpPr>
-            <a:spLocks noGrp="1"/>
-          </p:cNvSpPr>
-          <p:nvPr>
-            <p:ph idx="1"/>
-          </p:nvPr>
-        </p:nvSpPr>
-        <p:spPr/>
-        <p:txBody>
-          <a:bodyPr/>
-          <a:lstStyle/>
-          <a:p>
-            <a:endParaRPr lang="en-CA"/>
-          </a:p>
-        </p:txBody>
-      </p:sp>
-    </p:spTree>
-    <p:extLst>
-      <p:ext uri="{BB962C8B-B14F-4D97-AF65-F5344CB8AC3E}">
-        <p14:creationId xmlns:p14="http://schemas.microsoft.com/office/powerpoint/2010/main" val="3949814218"/>
-      </p:ext>
-    </p:extLst>
-  </p:cSld>
-  <p:clrMapOvr>
-    <a:masterClrMapping/>
-  </p:clrMapOvr>
-</p:sld>
-</file>
-
-<file path=ppt/slides/slide11.xml><?xml version="1.0" encoding="utf-8"?>
-<p:sld xmlns:a="http://schemas.openxmlformats.org/drawingml/2006/main" xmlns:r="http://schemas.openxmlformats.org/officeDocument/2006/relationships" xmlns:p="http://schemas.openxmlformats.org/presentationml/2006/main">
-  <p:cSld>
-    <p:spTree>
-      <p:nvGrpSpPr>
-        <p:cNvPr id="1" name=""/>
-        <p:cNvGrpSpPr/>
-        <p:nvPr/>
-      </p:nvGrpSpPr>
-      <p:grpSpPr>
-        <a:xfrm>
-          <a:off x="0" y="0"/>
-          <a:ext cx="0" cy="0"/>
-          <a:chOff x="0" y="0"/>
-          <a:chExt cx="0" cy="0"/>
-        </a:xfrm>
-      </p:grpSpPr>
-      <p:sp>
-        <p:nvSpPr>
-          <p:cNvPr id="2" name="Title 1">
-            <a:extLst>
-              <a:ext uri="{FF2B5EF4-FFF2-40B4-BE49-F238E27FC236}">
                 <a16:creationId xmlns:a16="http://schemas.microsoft.com/office/drawing/2014/main" id="{55A2955E-9C9C-4E0C-B0EE-ACDA5135FA53}"/>
               </a:ext>
             </a:extLst>
@@ -12748,7 +12664,7 @@
 </p:sld>
 </file>
 
-<file path=ppt/slides/slide12.xml><?xml version="1.0" encoding="utf-8"?>
+<file path=ppt/slides/slide11.xml><?xml version="1.0" encoding="utf-8"?>
 <p:sld xmlns:a="http://schemas.openxmlformats.org/drawingml/2006/main" xmlns:r="http://schemas.openxmlformats.org/officeDocument/2006/relationships" xmlns:p="http://schemas.openxmlformats.org/presentationml/2006/main">
   <p:cSld>
     <p:spTree>
@@ -12913,7 +12829,7 @@
 </p:sld>
 </file>
 
-<file path=ppt/slides/slide13.xml><?xml version="1.0" encoding="utf-8"?>
+<file path=ppt/slides/slide12.xml><?xml version="1.0" encoding="utf-8"?>
 <p:sld xmlns:a="http://schemas.openxmlformats.org/drawingml/2006/main" xmlns:r="http://schemas.openxmlformats.org/officeDocument/2006/relationships" xmlns:p="http://schemas.openxmlformats.org/presentationml/2006/main">
   <p:cSld>
     <p:spTree>
@@ -13552,144 +13468,6 @@
           <p:cNvPr id="2" name="Title 1">
             <a:extLst>
               <a:ext uri="{FF2B5EF4-FFF2-40B4-BE49-F238E27FC236}">
-                <a16:creationId xmlns:a16="http://schemas.microsoft.com/office/drawing/2014/main" id="{3C2E814B-D271-4F7B-A814-30A2432001DA}"/>
-              </a:ext>
-            </a:extLst>
-          </p:cNvPr>
-          <p:cNvSpPr>
-            <a:spLocks noGrp="1"/>
-          </p:cNvSpPr>
-          <p:nvPr>
-            <p:ph type="title"/>
-          </p:nvPr>
-        </p:nvSpPr>
-        <p:spPr/>
-        <p:txBody>
-          <a:bodyPr/>
-          <a:lstStyle/>
-          <a:p>
-            <a:r>
-              <a:rPr lang="en-US" altLang="en-US" dirty="0"/>
-              <a:t>“Daily” Scrum</a:t>
-            </a:r>
-            <a:endParaRPr lang="en-CA" dirty="0"/>
-          </a:p>
-        </p:txBody>
-      </p:sp>
-      <p:sp>
-        <p:nvSpPr>
-          <p:cNvPr id="3" name="Content Placeholder 2">
-            <a:extLst>
-              <a:ext uri="{FF2B5EF4-FFF2-40B4-BE49-F238E27FC236}">
-                <a16:creationId xmlns:a16="http://schemas.microsoft.com/office/drawing/2014/main" id="{B6747B46-4EB0-44F9-BFFD-12C29D633336}"/>
-              </a:ext>
-            </a:extLst>
-          </p:cNvPr>
-          <p:cNvSpPr>
-            <a:spLocks noGrp="1"/>
-          </p:cNvSpPr>
-          <p:nvPr>
-            <p:ph idx="1"/>
-          </p:nvPr>
-        </p:nvSpPr>
-        <p:spPr/>
-        <p:txBody>
-          <a:bodyPr/>
-          <a:lstStyle/>
-          <a:p>
-            <a:pPr>
-              <a:defRPr/>
-            </a:pPr>
-            <a:r>
-              <a:rPr lang="en-US" altLang="en-US" dirty="0"/>
-              <a:t>Display your group’s user story map for your proposed MVP for release 1</a:t>
-            </a:r>
-          </a:p>
-          <a:p>
-            <a:pPr lvl="1">
-              <a:defRPr/>
-            </a:pPr>
-            <a:r>
-              <a:rPr lang="en-US" altLang="en-US" dirty="0"/>
-              <a:t>Are you on track?</a:t>
-            </a:r>
-          </a:p>
-          <a:p>
-            <a:pPr lvl="1">
-              <a:defRPr/>
-            </a:pPr>
-            <a:r>
-              <a:rPr lang="en-US" altLang="en-US" dirty="0"/>
-              <a:t>Show what’s in the product backlog, in progress, done – make this clear, make this visible!</a:t>
-            </a:r>
-          </a:p>
-          <a:p>
-            <a:pPr>
-              <a:defRPr/>
-            </a:pPr>
-            <a:r>
-              <a:rPr lang="en-US" altLang="en-US" dirty="0"/>
-              <a:t>Any barriers to your group’s success?</a:t>
-            </a:r>
-          </a:p>
-          <a:p>
-            <a:pPr>
-              <a:defRPr/>
-            </a:pPr>
-            <a:r>
-              <a:rPr lang="en-US" altLang="en-US" dirty="0"/>
-              <a:t>Do you envision being able to achieve more (or less) for your release 1/MVP?</a:t>
-            </a:r>
-          </a:p>
-          <a:p>
-            <a:pPr>
-              <a:defRPr/>
-            </a:pPr>
-            <a:r>
-              <a:rPr lang="en-US" altLang="en-US" dirty="0"/>
-              <a:t>Other notes?</a:t>
-            </a:r>
-          </a:p>
-          <a:p>
-            <a:endParaRPr lang="en-CA" dirty="0"/>
-          </a:p>
-        </p:txBody>
-      </p:sp>
-    </p:spTree>
-    <p:extLst>
-      <p:ext uri="{BB962C8B-B14F-4D97-AF65-F5344CB8AC3E}">
-        <p14:creationId xmlns:p14="http://schemas.microsoft.com/office/powerpoint/2010/main" val="280459114"/>
-      </p:ext>
-    </p:extLst>
-  </p:cSld>
-  <p:clrMapOvr>
-    <a:masterClrMapping/>
-  </p:clrMapOvr>
-</p:sld>
-</file>
-
-<file path=ppt/slides/slide7.xml><?xml version="1.0" encoding="utf-8"?>
-<p:sld xmlns:a="http://schemas.openxmlformats.org/drawingml/2006/main" xmlns:r="http://schemas.openxmlformats.org/officeDocument/2006/relationships" xmlns:p="http://schemas.openxmlformats.org/presentationml/2006/main">
-  <p:cSld>
-    <p:spTree>
-      <p:nvGrpSpPr>
-        <p:cNvPr id="1" name=""/>
-        <p:cNvGrpSpPr/>
-        <p:nvPr/>
-      </p:nvGrpSpPr>
-      <p:grpSpPr>
-        <a:xfrm>
-          <a:off x="0" y="0"/>
-          <a:ext cx="0" cy="0"/>
-          <a:chOff x="0" y="0"/>
-          <a:chExt cx="0" cy="0"/>
-        </a:xfrm>
-      </p:grpSpPr>
-      <p:sp>
-        <p:nvSpPr>
-          <p:cNvPr id="2" name="Title 1">
-            <a:extLst>
-              <a:ext uri="{FF2B5EF4-FFF2-40B4-BE49-F238E27FC236}">
                 <a16:creationId xmlns:a16="http://schemas.microsoft.com/office/drawing/2014/main" id="{99A9A149-94DA-4552-9905-8C8DDCC3F16B}"/>
               </a:ext>
             </a:extLst>
@@ -13795,7 +13573,7 @@
 </p:sld>
 </file>
 
-<file path=ppt/slides/slide8.xml><?xml version="1.0" encoding="utf-8"?>
+<file path=ppt/slides/slide7.xml><?xml version="1.0" encoding="utf-8"?>
 <p:sld xmlns:a="http://schemas.openxmlformats.org/drawingml/2006/main" xmlns:r="http://schemas.openxmlformats.org/officeDocument/2006/relationships" xmlns:p="http://schemas.openxmlformats.org/presentationml/2006/main">
   <p:cSld>
     <p:spTree>
@@ -13922,7 +13700,7 @@
 </p:sld>
 </file>
 
-<file path=ppt/slides/slide9.xml><?xml version="1.0" encoding="utf-8"?>
+<file path=ppt/slides/slide8.xml><?xml version="1.0" encoding="utf-8"?>
 <p:sld xmlns:a="http://schemas.openxmlformats.org/drawingml/2006/main" xmlns:r="http://schemas.openxmlformats.org/officeDocument/2006/relationships" xmlns:p="http://schemas.openxmlformats.org/presentationml/2006/main">
   <p:cSld>
     <p:spTree>
@@ -14040,6 +13818,174 @@
     <p:extLst>
       <p:ext uri="{BB962C8B-B14F-4D97-AF65-F5344CB8AC3E}">
         <p14:creationId xmlns:p14="http://schemas.microsoft.com/office/powerpoint/2010/main" val="2921864237"/>
+      </p:ext>
+    </p:extLst>
+  </p:cSld>
+  <p:clrMapOvr>
+    <a:masterClrMapping/>
+  </p:clrMapOvr>
+</p:sld>
+</file>
+
+<file path=ppt/slides/slide9.xml><?xml version="1.0" encoding="utf-8"?>
+<p:sld xmlns:a="http://schemas.openxmlformats.org/drawingml/2006/main" xmlns:r="http://schemas.openxmlformats.org/officeDocument/2006/relationships" xmlns:p="http://schemas.openxmlformats.org/presentationml/2006/main">
+  <p:cSld>
+    <p:spTree>
+      <p:nvGrpSpPr>
+        <p:cNvPr id="1" name=""/>
+        <p:cNvGrpSpPr/>
+        <p:nvPr/>
+      </p:nvGrpSpPr>
+      <p:grpSpPr>
+        <a:xfrm>
+          <a:off x="0" y="0"/>
+          <a:ext cx="0" cy="0"/>
+          <a:chOff x="0" y="0"/>
+          <a:chExt cx="0" cy="0"/>
+        </a:xfrm>
+      </p:grpSpPr>
+      <p:sp>
+        <p:nvSpPr>
+          <p:cNvPr id="2" name="Title 1">
+            <a:extLst>
+              <a:ext uri="{FF2B5EF4-FFF2-40B4-BE49-F238E27FC236}">
+                <a16:creationId xmlns:a16="http://schemas.microsoft.com/office/drawing/2014/main" id="{9E742767-FEFC-48D4-8E9E-C81F2D5353EC}"/>
+              </a:ext>
+            </a:extLst>
+          </p:cNvPr>
+          <p:cNvSpPr>
+            <a:spLocks noGrp="1"/>
+          </p:cNvSpPr>
+          <p:nvPr>
+            <p:ph type="title"/>
+          </p:nvPr>
+        </p:nvSpPr>
+        <p:spPr>
+          <a:xfrm>
+            <a:off x="1531863" y="28353"/>
+            <a:ext cx="5528156" cy="1049079"/>
+          </a:xfrm>
+        </p:spPr>
+        <p:txBody>
+          <a:bodyPr/>
+          <a:lstStyle/>
+          <a:p>
+            <a:r>
+              <a:rPr lang="en-CA" dirty="0"/>
+              <a:t>Interface screen shots</a:t>
+            </a:r>
+          </a:p>
+        </p:txBody>
+      </p:sp>
+      <p:pic>
+        <p:nvPicPr>
+          <p:cNvPr id="5" name="Picture 4">
+            <a:extLst>
+              <a:ext uri="{FF2B5EF4-FFF2-40B4-BE49-F238E27FC236}">
+                <a16:creationId xmlns:a16="http://schemas.microsoft.com/office/drawing/2014/main" id="{B73F9905-7E40-46DF-A178-0A0B06B95FAA}"/>
+              </a:ext>
+            </a:extLst>
+          </p:cNvPr>
+          <p:cNvPicPr>
+            <a:picLocks noChangeAspect="1"/>
+          </p:cNvPicPr>
+          <p:nvPr/>
+        </p:nvPicPr>
+        <p:blipFill rotWithShape="1">
+          <a:blip r:embed="rId2">
+            <a:extLst>
+              <a:ext uri="{28A0092B-C50C-407E-A947-70E740481C1C}">
+                <a14:useLocalDpi xmlns:a14="http://schemas.microsoft.com/office/drawing/2010/main" val="0"/>
+              </a:ext>
+            </a:extLst>
+          </a:blip>
+          <a:srcRect l="3765" t="2225" r="4082" b="4220"/>
+          <a:stretch/>
+        </p:blipFill>
+        <p:spPr>
+          <a:xfrm>
+            <a:off x="277598" y="1331725"/>
+            <a:ext cx="3343776" cy="4044704"/>
+          </a:xfrm>
+          <a:prstGeom prst="rect">
+            <a:avLst/>
+          </a:prstGeom>
+        </p:spPr>
+      </p:pic>
+      <p:pic>
+        <p:nvPicPr>
+          <p:cNvPr id="7" name="Picture 6">
+            <a:extLst>
+              <a:ext uri="{FF2B5EF4-FFF2-40B4-BE49-F238E27FC236}">
+                <a16:creationId xmlns:a16="http://schemas.microsoft.com/office/drawing/2014/main" id="{D6715F03-9D76-46BD-BCAA-10BB7EFBC78A}"/>
+              </a:ext>
+            </a:extLst>
+          </p:cNvPr>
+          <p:cNvPicPr>
+            <a:picLocks noChangeAspect="1"/>
+          </p:cNvPicPr>
+          <p:nvPr/>
+        </p:nvPicPr>
+        <p:blipFill rotWithShape="1">
+          <a:blip r:embed="rId3">
+            <a:extLst>
+              <a:ext uri="{28A0092B-C50C-407E-A947-70E740481C1C}">
+                <a14:useLocalDpi xmlns:a14="http://schemas.microsoft.com/office/drawing/2010/main" val="0"/>
+              </a:ext>
+            </a:extLst>
+          </a:blip>
+          <a:srcRect l="4374" t="1928" r="10576" b="3027"/>
+          <a:stretch/>
+        </p:blipFill>
+        <p:spPr>
+          <a:xfrm>
+            <a:off x="3774559" y="1331725"/>
+            <a:ext cx="2033606" cy="4044705"/>
+          </a:xfrm>
+          <a:prstGeom prst="rect">
+            <a:avLst/>
+          </a:prstGeom>
+        </p:spPr>
+      </p:pic>
+      <p:pic>
+        <p:nvPicPr>
+          <p:cNvPr id="9" name="Picture 8">
+            <a:extLst>
+              <a:ext uri="{FF2B5EF4-FFF2-40B4-BE49-F238E27FC236}">
+                <a16:creationId xmlns:a16="http://schemas.microsoft.com/office/drawing/2014/main" id="{9DE3C980-BF56-449D-80E6-FEC91B4A550B}"/>
+              </a:ext>
+            </a:extLst>
+          </p:cNvPr>
+          <p:cNvPicPr>
+            <a:picLocks noChangeAspect="1"/>
+          </p:cNvPicPr>
+          <p:nvPr/>
+        </p:nvPicPr>
+        <p:blipFill rotWithShape="1">
+          <a:blip r:embed="rId4">
+            <a:extLst>
+              <a:ext uri="{28A0092B-C50C-407E-A947-70E740481C1C}">
+                <a14:useLocalDpi xmlns:a14="http://schemas.microsoft.com/office/drawing/2010/main" val="0"/>
+              </a:ext>
+            </a:extLst>
+          </a:blip>
+          <a:srcRect l="1681" t="3268" r="2748" b="3318"/>
+          <a:stretch/>
+        </p:blipFill>
+        <p:spPr>
+          <a:xfrm>
+            <a:off x="5961350" y="1331725"/>
+            <a:ext cx="5989646" cy="4044705"/>
+          </a:xfrm>
+          <a:prstGeom prst="rect">
+            <a:avLst/>
+          </a:prstGeom>
+        </p:spPr>
+      </p:pic>
+    </p:spTree>
+    <p:extLst>
+      <p:ext uri="{BB962C8B-B14F-4D97-AF65-F5344CB8AC3E}">
+        <p14:creationId xmlns:p14="http://schemas.microsoft.com/office/powerpoint/2010/main" val="3949814218"/>
       </p:ext>
     </p:extLst>
   </p:cSld>

</xml_diff>

<commit_message>
Updated: complete except for group reflection
</commit_message>
<xml_diff>
--- a/Milestone 5/ENSE 470 Milestone 5.pptx
+++ b/Milestone 5/ENSE 470 Milestone 5.pptx
@@ -173,7 +173,7 @@
           <a:noFill/>
           <a:extLst>
             <a:ext uri="{909E8E84-426E-40dd-AFC4-6F175D3DCCD1}">
-              <a14:hiddenFill xmlns:a14="http://schemas.microsoft.com/office/drawing/2010/main" xmlns="">
+              <a14:hiddenFill xmlns="" xmlns:a14="http://schemas.microsoft.com/office/drawing/2010/main">
                 <a:solidFill>
                   <a:srgbClr val="FFFFFF"/>
                 </a:solidFill>
@@ -233,7 +233,7 @@
             </a:ln>
             <a:extLst>
               <a:ext uri="{91240B29-F687-4f45-9708-019B960494DF}">
-                <a14:hiddenLine xmlns:a14="http://schemas.microsoft.com/office/drawing/2010/main" xmlns="" w="9525">
+                <a14:hiddenLine xmlns="" xmlns:a14="http://schemas.microsoft.com/office/drawing/2010/main" w="9525">
                   <a:solidFill>
                     <a:srgbClr val="000000"/>
                   </a:solidFill>
@@ -323,7 +323,7 @@
             </a:ln>
             <a:extLst>
               <a:ext uri="{91240B29-F687-4f45-9708-019B960494DF}">
-                <a14:hiddenLine xmlns:a14="http://schemas.microsoft.com/office/drawing/2010/main" xmlns="" w="9525">
+                <a14:hiddenLine xmlns="" xmlns:a14="http://schemas.microsoft.com/office/drawing/2010/main" w="9525">
                   <a:solidFill>
                     <a:srgbClr val="000000"/>
                   </a:solidFill>
@@ -413,7 +413,7 @@
             </a:ln>
             <a:extLst>
               <a:ext uri="{91240B29-F687-4f45-9708-019B960494DF}">
-                <a14:hiddenLine xmlns:a14="http://schemas.microsoft.com/office/drawing/2010/main" xmlns="" w="9525">
+                <a14:hiddenLine xmlns="" xmlns:a14="http://schemas.microsoft.com/office/drawing/2010/main" w="9525">
                   <a:solidFill>
                     <a:srgbClr val="000000"/>
                   </a:solidFill>
@@ -447,7 +447,7 @@
             </a:ln>
             <a:extLst>
               <a:ext uri="{91240B29-F687-4f45-9708-019B960494DF}">
-                <a14:hiddenLine xmlns:a14="http://schemas.microsoft.com/office/drawing/2010/main" xmlns="" w="9525">
+                <a14:hiddenLine xmlns="" xmlns:a14="http://schemas.microsoft.com/office/drawing/2010/main" w="9525">
                   <a:solidFill>
                     <a:srgbClr val="000000"/>
                   </a:solidFill>
@@ -537,7 +537,7 @@
             </a:ln>
             <a:extLst>
               <a:ext uri="{91240B29-F687-4f45-9708-019B960494DF}">
-                <a14:hiddenLine xmlns:a14="http://schemas.microsoft.com/office/drawing/2010/main" xmlns="" w="9525">
+                <a14:hiddenLine xmlns="" xmlns:a14="http://schemas.microsoft.com/office/drawing/2010/main" w="9525">
                   <a:solidFill>
                     <a:srgbClr val="000000"/>
                   </a:solidFill>
@@ -599,7 +599,7 @@
             </a:ln>
             <a:extLst>
               <a:ext uri="{91240B29-F687-4f45-9708-019B960494DF}">
-                <a14:hiddenLine xmlns:a14="http://schemas.microsoft.com/office/drawing/2010/main" xmlns="" w="9525">
+                <a14:hiddenLine xmlns="" xmlns:a14="http://schemas.microsoft.com/office/drawing/2010/main" w="9525">
                   <a:solidFill>
                     <a:srgbClr val="000000"/>
                   </a:solidFill>
@@ -661,7 +661,7 @@
             </a:ln>
             <a:extLst>
               <a:ext uri="{91240B29-F687-4f45-9708-019B960494DF}">
-                <a14:hiddenLine xmlns:a14="http://schemas.microsoft.com/office/drawing/2010/main" xmlns="" w="9525">
+                <a14:hiddenLine xmlns="" xmlns:a14="http://schemas.microsoft.com/office/drawing/2010/main" w="9525">
                   <a:solidFill>
                     <a:srgbClr val="000000"/>
                   </a:solidFill>
@@ -751,7 +751,7 @@
             </a:ln>
             <a:extLst>
               <a:ext uri="{91240B29-F687-4f45-9708-019B960494DF}">
-                <a14:hiddenLine xmlns:a14="http://schemas.microsoft.com/office/drawing/2010/main" xmlns="" w="9525">
+                <a14:hiddenLine xmlns="" xmlns:a14="http://schemas.microsoft.com/office/drawing/2010/main" w="9525">
                   <a:solidFill>
                     <a:srgbClr val="000000"/>
                   </a:solidFill>
@@ -813,7 +813,7 @@
             </a:ln>
             <a:extLst>
               <a:ext uri="{91240B29-F687-4f45-9708-019B960494DF}">
-                <a14:hiddenLine xmlns:a14="http://schemas.microsoft.com/office/drawing/2010/main" xmlns="" w="9525">
+                <a14:hiddenLine xmlns="" xmlns:a14="http://schemas.microsoft.com/office/drawing/2010/main" w="9525">
                   <a:solidFill>
                     <a:srgbClr val="000000"/>
                   </a:solidFill>
@@ -875,7 +875,7 @@
             </a:ln>
             <a:extLst>
               <a:ext uri="{91240B29-F687-4f45-9708-019B960494DF}">
-                <a14:hiddenLine xmlns:a14="http://schemas.microsoft.com/office/drawing/2010/main" xmlns="" w="9525">
+                <a14:hiddenLine xmlns="" xmlns:a14="http://schemas.microsoft.com/office/drawing/2010/main" w="9525">
                   <a:solidFill>
                     <a:srgbClr val="000000"/>
                   </a:solidFill>
@@ -965,7 +965,7 @@
             </a:ln>
             <a:extLst>
               <a:ext uri="{91240B29-F687-4f45-9708-019B960494DF}">
-                <a14:hiddenLine xmlns:a14="http://schemas.microsoft.com/office/drawing/2010/main" xmlns="" w="9525">
+                <a14:hiddenLine xmlns="" xmlns:a14="http://schemas.microsoft.com/office/drawing/2010/main" w="9525">
                   <a:solidFill>
                     <a:srgbClr val="000000"/>
                   </a:solidFill>
@@ -1055,7 +1055,7 @@
             </a:ln>
             <a:extLst>
               <a:ext uri="{91240B29-F687-4f45-9708-019B960494DF}">
-                <a14:hiddenLine xmlns:a14="http://schemas.microsoft.com/office/drawing/2010/main" xmlns="" w="9525">
+                <a14:hiddenLine xmlns="" xmlns:a14="http://schemas.microsoft.com/office/drawing/2010/main" w="9525">
                   <a:solidFill>
                     <a:srgbClr val="000000"/>
                   </a:solidFill>
@@ -1117,7 +1117,7 @@
             </a:ln>
             <a:extLst>
               <a:ext uri="{91240B29-F687-4f45-9708-019B960494DF}">
-                <a14:hiddenLine xmlns:a14="http://schemas.microsoft.com/office/drawing/2010/main" xmlns="" w="9525">
+                <a14:hiddenLine xmlns="" xmlns:a14="http://schemas.microsoft.com/office/drawing/2010/main" w="9525">
                   <a:solidFill>
                     <a:srgbClr val="000000"/>
                   </a:solidFill>
@@ -1227,7 +1227,7 @@
             </a:ln>
             <a:extLst>
               <a:ext uri="{91240B29-F687-4f45-9708-019B960494DF}">
-                <a14:hiddenLine xmlns:a14="http://schemas.microsoft.com/office/drawing/2010/main" xmlns="" w="9525">
+                <a14:hiddenLine xmlns="" xmlns:a14="http://schemas.microsoft.com/office/drawing/2010/main" w="9525">
                   <a:solidFill>
                     <a:srgbClr val="000000"/>
                   </a:solidFill>
@@ -1289,7 +1289,7 @@
             </a:ln>
             <a:extLst>
               <a:ext uri="{91240B29-F687-4f45-9708-019B960494DF}">
-                <a14:hiddenLine xmlns:a14="http://schemas.microsoft.com/office/drawing/2010/main" xmlns="" w="9525">
+                <a14:hiddenLine xmlns="" xmlns:a14="http://schemas.microsoft.com/office/drawing/2010/main" w="9525">
                   <a:solidFill>
                     <a:srgbClr val="000000"/>
                   </a:solidFill>
@@ -1379,7 +1379,7 @@
             </a:ln>
             <a:extLst>
               <a:ext uri="{91240B29-F687-4f45-9708-019B960494DF}">
-                <a14:hiddenLine xmlns:a14="http://schemas.microsoft.com/office/drawing/2010/main" xmlns="" w="9525">
+                <a14:hiddenLine xmlns="" xmlns:a14="http://schemas.microsoft.com/office/drawing/2010/main" w="9525">
                   <a:solidFill>
                     <a:srgbClr val="000000"/>
                   </a:solidFill>
@@ -1469,7 +1469,7 @@
             </a:ln>
             <a:extLst>
               <a:ext uri="{91240B29-F687-4f45-9708-019B960494DF}">
-                <a14:hiddenLine xmlns:a14="http://schemas.microsoft.com/office/drawing/2010/main" xmlns="" w="9525">
+                <a14:hiddenLine xmlns="" xmlns:a14="http://schemas.microsoft.com/office/drawing/2010/main" w="9525">
                   <a:solidFill>
                     <a:srgbClr val="000000"/>
                   </a:solidFill>
@@ -1531,7 +1531,7 @@
             </a:ln>
             <a:extLst>
               <a:ext uri="{91240B29-F687-4f45-9708-019B960494DF}">
-                <a14:hiddenLine xmlns:a14="http://schemas.microsoft.com/office/drawing/2010/main" xmlns="" w="9525">
+                <a14:hiddenLine xmlns="" xmlns:a14="http://schemas.microsoft.com/office/drawing/2010/main" w="9525">
                   <a:solidFill>
                     <a:srgbClr val="000000"/>
                   </a:solidFill>
@@ -1621,7 +1621,7 @@
             </a:ln>
             <a:extLst>
               <a:ext uri="{91240B29-F687-4f45-9708-019B960494DF}">
-                <a14:hiddenLine xmlns:a14="http://schemas.microsoft.com/office/drawing/2010/main" xmlns="" w="9525">
+                <a14:hiddenLine xmlns="" xmlns:a14="http://schemas.microsoft.com/office/drawing/2010/main" w="9525">
                   <a:solidFill>
                     <a:srgbClr val="000000"/>
                   </a:solidFill>
@@ -1711,7 +1711,7 @@
             </a:ln>
             <a:extLst>
               <a:ext uri="{91240B29-F687-4f45-9708-019B960494DF}">
-                <a14:hiddenLine xmlns:a14="http://schemas.microsoft.com/office/drawing/2010/main" xmlns="" w="9525">
+                <a14:hiddenLine xmlns="" xmlns:a14="http://schemas.microsoft.com/office/drawing/2010/main" w="9525">
                   <a:solidFill>
                     <a:srgbClr val="000000"/>
                   </a:solidFill>
@@ -1767,7 +1767,7 @@
             </a:ln>
             <a:extLst>
               <a:ext uri="{91240B29-F687-4f45-9708-019B960494DF}">
-                <a14:hiddenLine xmlns:a14="http://schemas.microsoft.com/office/drawing/2010/main" xmlns="" w="9525">
+                <a14:hiddenLine xmlns="" xmlns:a14="http://schemas.microsoft.com/office/drawing/2010/main" w="9525">
                   <a:solidFill>
                     <a:srgbClr val="000000"/>
                   </a:solidFill>
@@ -1857,7 +1857,7 @@
             </a:ln>
             <a:extLst>
               <a:ext uri="{91240B29-F687-4f45-9708-019B960494DF}">
-                <a14:hiddenLine xmlns:a14="http://schemas.microsoft.com/office/drawing/2010/main" xmlns="" w="9525">
+                <a14:hiddenLine xmlns="" xmlns:a14="http://schemas.microsoft.com/office/drawing/2010/main" w="9525">
                   <a:solidFill>
                     <a:srgbClr val="000000"/>
                   </a:solidFill>
@@ -1913,7 +1913,7 @@
             </a:ln>
             <a:extLst>
               <a:ext uri="{91240B29-F687-4f45-9708-019B960494DF}">
-                <a14:hiddenLine xmlns:a14="http://schemas.microsoft.com/office/drawing/2010/main" xmlns="" w="9525">
+                <a14:hiddenLine xmlns="" xmlns:a14="http://schemas.microsoft.com/office/drawing/2010/main" w="9525">
                   <a:solidFill>
                     <a:srgbClr val="000000"/>
                   </a:solidFill>
@@ -2003,7 +2003,7 @@
             </a:ln>
             <a:extLst>
               <a:ext uri="{91240B29-F687-4f45-9708-019B960494DF}">
-                <a14:hiddenLine xmlns:a14="http://schemas.microsoft.com/office/drawing/2010/main" xmlns="" w="9525">
+                <a14:hiddenLine xmlns="" xmlns:a14="http://schemas.microsoft.com/office/drawing/2010/main" w="9525">
                   <a:solidFill>
                     <a:srgbClr val="000000"/>
                   </a:solidFill>
@@ -2071,7 +2071,7 @@
             </a:ln>
             <a:extLst>
               <a:ext uri="{91240B29-F687-4f45-9708-019B960494DF}">
-                <a14:hiddenLine xmlns:a14="http://schemas.microsoft.com/office/drawing/2010/main" xmlns="" w="9525">
+                <a14:hiddenLine xmlns="" xmlns:a14="http://schemas.microsoft.com/office/drawing/2010/main" w="9525">
                   <a:solidFill>
                     <a:srgbClr val="000000"/>
                   </a:solidFill>
@@ -2161,7 +2161,7 @@
             </a:ln>
             <a:extLst>
               <a:ext uri="{91240B29-F687-4f45-9708-019B960494DF}">
-                <a14:hiddenLine xmlns:a14="http://schemas.microsoft.com/office/drawing/2010/main" xmlns="" w="9525">
+                <a14:hiddenLine xmlns="" xmlns:a14="http://schemas.microsoft.com/office/drawing/2010/main" w="9525">
                   <a:solidFill>
                     <a:srgbClr val="000000"/>
                   </a:solidFill>
@@ -2229,7 +2229,7 @@
             </a:ln>
             <a:extLst>
               <a:ext uri="{91240B29-F687-4f45-9708-019B960494DF}">
-                <a14:hiddenLine xmlns:a14="http://schemas.microsoft.com/office/drawing/2010/main" xmlns="" w="9525">
+                <a14:hiddenLine xmlns="" xmlns:a14="http://schemas.microsoft.com/office/drawing/2010/main" w="9525">
                   <a:solidFill>
                     <a:srgbClr val="000000"/>
                   </a:solidFill>
@@ -2319,7 +2319,7 @@
             </a:ln>
             <a:extLst>
               <a:ext uri="{91240B29-F687-4f45-9708-019B960494DF}">
-                <a14:hiddenLine xmlns:a14="http://schemas.microsoft.com/office/drawing/2010/main" xmlns="" w="9525">
+                <a14:hiddenLine xmlns="" xmlns:a14="http://schemas.microsoft.com/office/drawing/2010/main" w="9525">
                   <a:solidFill>
                     <a:srgbClr val="000000"/>
                   </a:solidFill>
@@ -2353,7 +2353,7 @@
             </a:ln>
             <a:extLst>
               <a:ext uri="{91240B29-F687-4f45-9708-019B960494DF}">
-                <a14:hiddenLine xmlns:a14="http://schemas.microsoft.com/office/drawing/2010/main" xmlns="" w="9525">
+                <a14:hiddenLine xmlns="" xmlns:a14="http://schemas.microsoft.com/office/drawing/2010/main" w="9525">
                   <a:solidFill>
                     <a:srgbClr val="000000"/>
                   </a:solidFill>
@@ -2443,7 +2443,7 @@
             </a:ln>
             <a:extLst>
               <a:ext uri="{91240B29-F687-4f45-9708-019B960494DF}">
-                <a14:hiddenLine xmlns:a14="http://schemas.microsoft.com/office/drawing/2010/main" xmlns="" w="9525">
+                <a14:hiddenLine xmlns="" xmlns:a14="http://schemas.microsoft.com/office/drawing/2010/main" w="9525">
                   <a:solidFill>
                     <a:srgbClr val="000000"/>
                   </a:solidFill>
@@ -2505,7 +2505,7 @@
             </a:ln>
             <a:extLst>
               <a:ext uri="{91240B29-F687-4f45-9708-019B960494DF}">
-                <a14:hiddenLine xmlns:a14="http://schemas.microsoft.com/office/drawing/2010/main" xmlns="" w="9525">
+                <a14:hiddenLine xmlns="" xmlns:a14="http://schemas.microsoft.com/office/drawing/2010/main" w="9525">
                   <a:solidFill>
                     <a:srgbClr val="000000"/>
                   </a:solidFill>
@@ -2567,7 +2567,7 @@
             </a:ln>
             <a:extLst>
               <a:ext uri="{91240B29-F687-4f45-9708-019B960494DF}">
-                <a14:hiddenLine xmlns:a14="http://schemas.microsoft.com/office/drawing/2010/main" xmlns="" w="9525">
+                <a14:hiddenLine xmlns="" xmlns:a14="http://schemas.microsoft.com/office/drawing/2010/main" w="9525">
                   <a:solidFill>
                     <a:srgbClr val="000000"/>
                   </a:solidFill>
@@ -2657,7 +2657,7 @@
             </a:ln>
             <a:extLst>
               <a:ext uri="{91240B29-F687-4f45-9708-019B960494DF}">
-                <a14:hiddenLine xmlns:a14="http://schemas.microsoft.com/office/drawing/2010/main" xmlns="" w="9525">
+                <a14:hiddenLine xmlns="" xmlns:a14="http://schemas.microsoft.com/office/drawing/2010/main" w="9525">
                   <a:solidFill>
                     <a:srgbClr val="000000"/>
                   </a:solidFill>
@@ -2725,7 +2725,7 @@
             </a:ln>
             <a:extLst>
               <a:ext uri="{91240B29-F687-4f45-9708-019B960494DF}">
-                <a14:hiddenLine xmlns:a14="http://schemas.microsoft.com/office/drawing/2010/main" xmlns="" w="9525">
+                <a14:hiddenLine xmlns="" xmlns:a14="http://schemas.microsoft.com/office/drawing/2010/main" w="9525">
                   <a:solidFill>
                     <a:srgbClr val="000000"/>
                   </a:solidFill>
@@ -2787,7 +2787,7 @@
             </a:ln>
             <a:extLst>
               <a:ext uri="{91240B29-F687-4f45-9708-019B960494DF}">
-                <a14:hiddenLine xmlns:a14="http://schemas.microsoft.com/office/drawing/2010/main" xmlns="" w="9525">
+                <a14:hiddenLine xmlns="" xmlns:a14="http://schemas.microsoft.com/office/drawing/2010/main" w="9525">
                   <a:solidFill>
                     <a:srgbClr val="000000"/>
                   </a:solidFill>
@@ -2877,7 +2877,7 @@
             </a:ln>
             <a:extLst>
               <a:ext uri="{91240B29-F687-4f45-9708-019B960494DF}">
-                <a14:hiddenLine xmlns:a14="http://schemas.microsoft.com/office/drawing/2010/main" xmlns="" w="9525">
+                <a14:hiddenLine xmlns="" xmlns:a14="http://schemas.microsoft.com/office/drawing/2010/main" w="9525">
                   <a:solidFill>
                     <a:srgbClr val="000000"/>
                   </a:solidFill>
@@ -2939,7 +2939,7 @@
             </a:ln>
             <a:extLst>
               <a:ext uri="{91240B29-F687-4f45-9708-019B960494DF}">
-                <a14:hiddenLine xmlns:a14="http://schemas.microsoft.com/office/drawing/2010/main" xmlns="" w="9525">
+                <a14:hiddenLine xmlns="" xmlns:a14="http://schemas.microsoft.com/office/drawing/2010/main" w="9525">
                   <a:solidFill>
                     <a:srgbClr val="000000"/>
                   </a:solidFill>
@@ -3029,7 +3029,7 @@
             </a:ln>
             <a:extLst>
               <a:ext uri="{91240B29-F687-4f45-9708-019B960494DF}">
-                <a14:hiddenLine xmlns:a14="http://schemas.microsoft.com/office/drawing/2010/main" xmlns="" w="9525">
+                <a14:hiddenLine xmlns="" xmlns:a14="http://schemas.microsoft.com/office/drawing/2010/main" w="9525">
                   <a:solidFill>
                     <a:srgbClr val="000000"/>
                   </a:solidFill>
@@ -3091,7 +3091,7 @@
             </a:ln>
             <a:extLst>
               <a:ext uri="{91240B29-F687-4f45-9708-019B960494DF}">
-                <a14:hiddenLine xmlns:a14="http://schemas.microsoft.com/office/drawing/2010/main" xmlns="" w="9525">
+                <a14:hiddenLine xmlns="" xmlns:a14="http://schemas.microsoft.com/office/drawing/2010/main" w="9525">
                   <a:solidFill>
                     <a:srgbClr val="000000"/>
                   </a:solidFill>
@@ -3181,7 +3181,7 @@
             </a:ln>
             <a:extLst>
               <a:ext uri="{91240B29-F687-4f45-9708-019B960494DF}">
-                <a14:hiddenLine xmlns:a14="http://schemas.microsoft.com/office/drawing/2010/main" xmlns="" w="9525">
+                <a14:hiddenLine xmlns="" xmlns:a14="http://schemas.microsoft.com/office/drawing/2010/main" w="9525">
                   <a:solidFill>
                     <a:srgbClr val="000000"/>
                   </a:solidFill>
@@ -3215,7 +3215,7 @@
             </a:ln>
             <a:extLst>
               <a:ext uri="{91240B29-F687-4f45-9708-019B960494DF}">
-                <a14:hiddenLine xmlns:a14="http://schemas.microsoft.com/office/drawing/2010/main" xmlns="" w="9525">
+                <a14:hiddenLine xmlns="" xmlns:a14="http://schemas.microsoft.com/office/drawing/2010/main" w="9525">
                   <a:solidFill>
                     <a:srgbClr val="000000"/>
                   </a:solidFill>
@@ -3280,7 +3280,7 @@
             </a:ln>
             <a:extLst>
               <a:ext uri="{91240B29-F687-4f45-9708-019B960494DF}">
-                <a14:hiddenLine xmlns:a14="http://schemas.microsoft.com/office/drawing/2010/main" xmlns="" w="9525">
+                <a14:hiddenLine xmlns="" xmlns:a14="http://schemas.microsoft.com/office/drawing/2010/main" w="9525">
                   <a:solidFill>
                     <a:srgbClr val="000000"/>
                   </a:solidFill>
@@ -3370,7 +3370,7 @@
             </a:ln>
             <a:extLst>
               <a:ext uri="{91240B29-F687-4f45-9708-019B960494DF}">
-                <a14:hiddenLine xmlns:a14="http://schemas.microsoft.com/office/drawing/2010/main" xmlns="" w="9525">
+                <a14:hiddenLine xmlns="" xmlns:a14="http://schemas.microsoft.com/office/drawing/2010/main" w="9525">
                   <a:solidFill>
                     <a:srgbClr val="000000"/>
                   </a:solidFill>
@@ -3432,7 +3432,7 @@
             </a:ln>
             <a:extLst>
               <a:ext uri="{91240B29-F687-4f45-9708-019B960494DF}">
-                <a14:hiddenLine xmlns:a14="http://schemas.microsoft.com/office/drawing/2010/main" xmlns="" w="9525">
+                <a14:hiddenLine xmlns="" xmlns:a14="http://schemas.microsoft.com/office/drawing/2010/main" w="9525">
                   <a:solidFill>
                     <a:srgbClr val="000000"/>
                   </a:solidFill>
@@ -3522,7 +3522,7 @@
             </a:ln>
             <a:extLst>
               <a:ext uri="{91240B29-F687-4f45-9708-019B960494DF}">
-                <a14:hiddenLine xmlns:a14="http://schemas.microsoft.com/office/drawing/2010/main" xmlns="" w="9525">
+                <a14:hiddenLine xmlns="" xmlns:a14="http://schemas.microsoft.com/office/drawing/2010/main" w="9525">
                   <a:solidFill>
                     <a:srgbClr val="000000"/>
                   </a:solidFill>
@@ -3612,7 +3612,7 @@
             </a:ln>
             <a:extLst>
               <a:ext uri="{91240B29-F687-4f45-9708-019B960494DF}">
-                <a14:hiddenLine xmlns:a14="http://schemas.microsoft.com/office/drawing/2010/main" xmlns="" w="9525">
+                <a14:hiddenLine xmlns="" xmlns:a14="http://schemas.microsoft.com/office/drawing/2010/main" w="9525">
                   <a:solidFill>
                     <a:srgbClr val="000000"/>
                   </a:solidFill>
@@ -3677,7 +3677,7 @@
             </a:ln>
             <a:extLst>
               <a:ext uri="{91240B29-F687-4f45-9708-019B960494DF}">
-                <a14:hiddenLine xmlns:a14="http://schemas.microsoft.com/office/drawing/2010/main" xmlns="" w="9525">
+                <a14:hiddenLine xmlns="" xmlns:a14="http://schemas.microsoft.com/office/drawing/2010/main" w="9525">
                   <a:solidFill>
                     <a:srgbClr val="000000"/>
                   </a:solidFill>
@@ -3739,7 +3739,7 @@
             </a:ln>
             <a:extLst>
               <a:ext uri="{91240B29-F687-4f45-9708-019B960494DF}">
-                <a14:hiddenLine xmlns:a14="http://schemas.microsoft.com/office/drawing/2010/main" xmlns="" w="9525">
+                <a14:hiddenLine xmlns="" xmlns:a14="http://schemas.microsoft.com/office/drawing/2010/main" w="9525">
                   <a:solidFill>
                     <a:srgbClr val="000000"/>
                   </a:solidFill>
@@ -3829,7 +3829,7 @@
             </a:ln>
             <a:extLst>
               <a:ext uri="{91240B29-F687-4f45-9708-019B960494DF}">
-                <a14:hiddenLine xmlns:a14="http://schemas.microsoft.com/office/drawing/2010/main" xmlns="" w="9525">
+                <a14:hiddenLine xmlns="" xmlns:a14="http://schemas.microsoft.com/office/drawing/2010/main" w="9525">
                   <a:solidFill>
                     <a:srgbClr val="000000"/>
                   </a:solidFill>
@@ -3919,7 +3919,7 @@
             </a:ln>
             <a:extLst>
               <a:ext uri="{91240B29-F687-4f45-9708-019B960494DF}">
-                <a14:hiddenLine xmlns:a14="http://schemas.microsoft.com/office/drawing/2010/main" xmlns="" w="9525">
+                <a14:hiddenLine xmlns="" xmlns:a14="http://schemas.microsoft.com/office/drawing/2010/main" w="9525">
                   <a:solidFill>
                     <a:srgbClr val="000000"/>
                   </a:solidFill>
@@ -3981,7 +3981,7 @@
             </a:ln>
             <a:extLst>
               <a:ext uri="{91240B29-F687-4f45-9708-019B960494DF}">
-                <a14:hiddenLine xmlns:a14="http://schemas.microsoft.com/office/drawing/2010/main" xmlns="" w="9525">
+                <a14:hiddenLine xmlns="" xmlns:a14="http://schemas.microsoft.com/office/drawing/2010/main" w="9525">
                   <a:solidFill>
                     <a:srgbClr val="000000"/>
                   </a:solidFill>
@@ -4101,7 +4101,7 @@
             </a:ln>
             <a:extLst>
               <a:ext uri="{91240B29-F687-4f45-9708-019B960494DF}">
-                <a14:hiddenLine xmlns:a14="http://schemas.microsoft.com/office/drawing/2010/main" xmlns="" w="9525">
+                <a14:hiddenLine xmlns="" xmlns:a14="http://schemas.microsoft.com/office/drawing/2010/main" w="9525">
                   <a:solidFill>
                     <a:srgbClr val="000000"/>
                   </a:solidFill>
@@ -4169,7 +4169,7 @@
             </a:ln>
             <a:extLst>
               <a:ext uri="{91240B29-F687-4f45-9708-019B960494DF}">
-                <a14:hiddenLine xmlns:a14="http://schemas.microsoft.com/office/drawing/2010/main" xmlns="" w="9525">
+                <a14:hiddenLine xmlns="" xmlns:a14="http://schemas.microsoft.com/office/drawing/2010/main" w="9525">
                   <a:solidFill>
                     <a:srgbClr val="000000"/>
                   </a:solidFill>
@@ -4259,7 +4259,7 @@
             </a:ln>
             <a:extLst>
               <a:ext uri="{91240B29-F687-4f45-9708-019B960494DF}">
-                <a14:hiddenLine xmlns:a14="http://schemas.microsoft.com/office/drawing/2010/main" xmlns="" w="9525">
+                <a14:hiddenLine xmlns="" xmlns:a14="http://schemas.microsoft.com/office/drawing/2010/main" w="9525">
                   <a:solidFill>
                     <a:srgbClr val="000000"/>
                   </a:solidFill>
@@ -4399,7 +4399,7 @@
           <a:p>
             <a:fld id="{5969946C-D33D-4FE7-A308-266207BA8A2A}" type="datetimeFigureOut">
               <a:rPr lang="en-CA" smtClean="0"/>
-              <a:t>2018-03-15</a:t>
+              <a:t>2018-03-28</a:t>
             </a:fld>
             <a:endParaRPr lang="en-CA"/>
           </a:p>
@@ -4666,7 +4666,7 @@
           <a:p>
             <a:fld id="{5969946C-D33D-4FE7-A308-266207BA8A2A}" type="datetimeFigureOut">
               <a:rPr lang="en-CA" smtClean="0"/>
-              <a:t>2018-03-15</a:t>
+              <a:t>2018-03-28</a:t>
             </a:fld>
             <a:endParaRPr lang="en-CA"/>
           </a:p>
@@ -4862,7 +4862,7 @@
           <a:p>
             <a:fld id="{5969946C-D33D-4FE7-A308-266207BA8A2A}" type="datetimeFigureOut">
               <a:rPr lang="en-CA" smtClean="0"/>
-              <a:t>2018-03-15</a:t>
+              <a:t>2018-03-28</a:t>
             </a:fld>
             <a:endParaRPr lang="en-CA"/>
           </a:p>
@@ -5125,7 +5125,7 @@
           <a:p>
             <a:fld id="{5969946C-D33D-4FE7-A308-266207BA8A2A}" type="datetimeFigureOut">
               <a:rPr lang="en-CA" smtClean="0"/>
-              <a:t>2018-03-15</a:t>
+              <a:t>2018-03-28</a:t>
             </a:fld>
             <a:endParaRPr lang="en-CA"/>
           </a:p>
@@ -5559,7 +5559,7 @@
           <a:p>
             <a:fld id="{5969946C-D33D-4FE7-A308-266207BA8A2A}" type="datetimeFigureOut">
               <a:rPr lang="en-CA" smtClean="0"/>
-              <a:t>2018-03-15</a:t>
+              <a:t>2018-03-28</a:t>
             </a:fld>
             <a:endParaRPr lang="en-CA"/>
           </a:p>
@@ -6105,7 +6105,7 @@
           <a:p>
             <a:fld id="{5969946C-D33D-4FE7-A308-266207BA8A2A}" type="datetimeFigureOut">
               <a:rPr lang="en-CA" smtClean="0"/>
-              <a:t>2018-03-15</a:t>
+              <a:t>2018-03-28</a:t>
             </a:fld>
             <a:endParaRPr lang="en-CA"/>
           </a:p>
@@ -6825,7 +6825,7 @@
           <a:p>
             <a:fld id="{5969946C-D33D-4FE7-A308-266207BA8A2A}" type="datetimeFigureOut">
               <a:rPr lang="en-CA" smtClean="0"/>
-              <a:t>2018-03-15</a:t>
+              <a:t>2018-03-28</a:t>
             </a:fld>
             <a:endParaRPr lang="en-CA"/>
           </a:p>
@@ -6995,7 +6995,7 @@
           <a:p>
             <a:fld id="{5969946C-D33D-4FE7-A308-266207BA8A2A}" type="datetimeFigureOut">
               <a:rPr lang="en-CA" smtClean="0"/>
-              <a:t>2018-03-15</a:t>
+              <a:t>2018-03-28</a:t>
             </a:fld>
             <a:endParaRPr lang="en-CA"/>
           </a:p>
@@ -7175,7 +7175,7 @@
           <a:p>
             <a:fld id="{5969946C-D33D-4FE7-A308-266207BA8A2A}" type="datetimeFigureOut">
               <a:rPr lang="en-CA" smtClean="0"/>
-              <a:t>2018-03-15</a:t>
+              <a:t>2018-03-28</a:t>
             </a:fld>
             <a:endParaRPr lang="en-CA"/>
           </a:p>
@@ -7345,7 +7345,7 @@
           <a:p>
             <a:fld id="{5969946C-D33D-4FE7-A308-266207BA8A2A}" type="datetimeFigureOut">
               <a:rPr lang="en-CA" smtClean="0"/>
-              <a:t>2018-03-15</a:t>
+              <a:t>2018-03-28</a:t>
             </a:fld>
             <a:endParaRPr lang="en-CA"/>
           </a:p>
@@ -7595,7 +7595,7 @@
           <a:p>
             <a:fld id="{5969946C-D33D-4FE7-A308-266207BA8A2A}" type="datetimeFigureOut">
               <a:rPr lang="en-CA" smtClean="0"/>
-              <a:t>2018-03-15</a:t>
+              <a:t>2018-03-28</a:t>
             </a:fld>
             <a:endParaRPr lang="en-CA"/>
           </a:p>
@@ -7827,7 +7827,7 @@
           <a:p>
             <a:fld id="{5969946C-D33D-4FE7-A308-266207BA8A2A}" type="datetimeFigureOut">
               <a:rPr lang="en-CA" smtClean="0"/>
-              <a:t>2018-03-15</a:t>
+              <a:t>2018-03-28</a:t>
             </a:fld>
             <a:endParaRPr lang="en-CA"/>
           </a:p>
@@ -8208,7 +8208,7 @@
           <a:p>
             <a:fld id="{5969946C-D33D-4FE7-A308-266207BA8A2A}" type="datetimeFigureOut">
               <a:rPr lang="en-CA" smtClean="0"/>
-              <a:t>2018-03-15</a:t>
+              <a:t>2018-03-28</a:t>
             </a:fld>
             <a:endParaRPr lang="en-CA"/>
           </a:p>
@@ -8326,7 +8326,7 @@
           <a:p>
             <a:fld id="{5969946C-D33D-4FE7-A308-266207BA8A2A}" type="datetimeFigureOut">
               <a:rPr lang="en-CA" smtClean="0"/>
-              <a:t>2018-03-15</a:t>
+              <a:t>2018-03-28</a:t>
             </a:fld>
             <a:endParaRPr lang="en-CA"/>
           </a:p>
@@ -8421,7 +8421,7 @@
           <a:p>
             <a:fld id="{5969946C-D33D-4FE7-A308-266207BA8A2A}" type="datetimeFigureOut">
               <a:rPr lang="en-CA" smtClean="0"/>
-              <a:t>2018-03-15</a:t>
+              <a:t>2018-03-28</a:t>
             </a:fld>
             <a:endParaRPr lang="en-CA"/>
           </a:p>
@@ -8670,7 +8670,7 @@
           <a:p>
             <a:fld id="{5969946C-D33D-4FE7-A308-266207BA8A2A}" type="datetimeFigureOut">
               <a:rPr lang="en-CA" smtClean="0"/>
-              <a:t>2018-03-15</a:t>
+              <a:t>2018-03-28</a:t>
             </a:fld>
             <a:endParaRPr lang="en-CA"/>
           </a:p>
@@ -8950,7 +8950,7 @@
           <a:p>
             <a:fld id="{5969946C-D33D-4FE7-A308-266207BA8A2A}" type="datetimeFigureOut">
               <a:rPr lang="en-CA" smtClean="0"/>
-              <a:t>2018-03-15</a:t>
+              <a:t>2018-03-28</a:t>
             </a:fld>
             <a:endParaRPr lang="en-CA"/>
           </a:p>
@@ -9066,7 +9066,7 @@
           <a:noFill/>
           <a:extLst>
             <a:ext uri="{909E8E84-426E-40dd-AFC4-6F175D3DCCD1}">
-              <a14:hiddenFill xmlns:a14="http://schemas.microsoft.com/office/drawing/2010/main" xmlns="">
+              <a14:hiddenFill xmlns="" xmlns:a14="http://schemas.microsoft.com/office/drawing/2010/main">
                 <a:solidFill>
                   <a:srgbClr val="FFFFFF"/>
                 </a:solidFill>
@@ -9140,7 +9140,7 @@
               </a:ln>
               <a:extLst>
                 <a:ext uri="{91240B29-F687-4f45-9708-019B960494DF}">
-                  <a14:hiddenLine xmlns:a14="http://schemas.microsoft.com/office/drawing/2010/main" xmlns="" w="9525">
+                  <a14:hiddenLine xmlns="" xmlns:a14="http://schemas.microsoft.com/office/drawing/2010/main" w="9525">
                     <a:solidFill>
                       <a:srgbClr val="000000"/>
                     </a:solidFill>
@@ -9230,7 +9230,7 @@
               </a:ln>
               <a:extLst>
                 <a:ext uri="{91240B29-F687-4f45-9708-019B960494DF}">
-                  <a14:hiddenLine xmlns:a14="http://schemas.microsoft.com/office/drawing/2010/main" xmlns="" w="9525">
+                  <a14:hiddenLine xmlns="" xmlns:a14="http://schemas.microsoft.com/office/drawing/2010/main" w="9525">
                     <a:solidFill>
                       <a:srgbClr val="000000"/>
                     </a:solidFill>
@@ -9320,7 +9320,7 @@
               </a:ln>
               <a:extLst>
                 <a:ext uri="{91240B29-F687-4f45-9708-019B960494DF}">
-                  <a14:hiddenLine xmlns:a14="http://schemas.microsoft.com/office/drawing/2010/main" xmlns="" w="9525">
+                  <a14:hiddenLine xmlns="" xmlns:a14="http://schemas.microsoft.com/office/drawing/2010/main" w="9525">
                     <a:solidFill>
                       <a:srgbClr val="000000"/>
                     </a:solidFill>
@@ -9382,7 +9382,7 @@
               </a:ln>
               <a:extLst>
                 <a:ext uri="{91240B29-F687-4f45-9708-019B960494DF}">
-                  <a14:hiddenLine xmlns:a14="http://schemas.microsoft.com/office/drawing/2010/main" xmlns="" w="9525">
+                  <a14:hiddenLine xmlns="" xmlns:a14="http://schemas.microsoft.com/office/drawing/2010/main" w="9525">
                     <a:solidFill>
                       <a:srgbClr val="000000"/>
                     </a:solidFill>
@@ -9472,7 +9472,7 @@
               </a:ln>
               <a:extLst>
                 <a:ext uri="{91240B29-F687-4f45-9708-019B960494DF}">
-                  <a14:hiddenLine xmlns:a14="http://schemas.microsoft.com/office/drawing/2010/main" xmlns="" w="9525">
+                  <a14:hiddenLine xmlns="" xmlns:a14="http://schemas.microsoft.com/office/drawing/2010/main" w="9525">
                     <a:solidFill>
                       <a:srgbClr val="000000"/>
                     </a:solidFill>
@@ -9534,7 +9534,7 @@
               </a:ln>
               <a:extLst>
                 <a:ext uri="{91240B29-F687-4f45-9708-019B960494DF}">
-                  <a14:hiddenLine xmlns:a14="http://schemas.microsoft.com/office/drawing/2010/main" xmlns="" w="9525">
+                  <a14:hiddenLine xmlns="" xmlns:a14="http://schemas.microsoft.com/office/drawing/2010/main" w="9525">
                     <a:solidFill>
                       <a:srgbClr val="000000"/>
                     </a:solidFill>
@@ -9596,7 +9596,7 @@
               </a:ln>
               <a:extLst>
                 <a:ext uri="{91240B29-F687-4f45-9708-019B960494DF}">
-                  <a14:hiddenLine xmlns:a14="http://schemas.microsoft.com/office/drawing/2010/main" xmlns="" w="9525">
+                  <a14:hiddenLine xmlns="" xmlns:a14="http://schemas.microsoft.com/office/drawing/2010/main" w="9525">
                     <a:solidFill>
                       <a:srgbClr val="000000"/>
                     </a:solidFill>
@@ -9686,7 +9686,7 @@
               </a:ln>
               <a:extLst>
                 <a:ext uri="{91240B29-F687-4f45-9708-019B960494DF}">
-                  <a14:hiddenLine xmlns:a14="http://schemas.microsoft.com/office/drawing/2010/main" xmlns="" w="9525">
+                  <a14:hiddenLine xmlns="" xmlns:a14="http://schemas.microsoft.com/office/drawing/2010/main" w="9525">
                     <a:solidFill>
                       <a:srgbClr val="000000"/>
                     </a:solidFill>
@@ -9776,7 +9776,7 @@
               </a:ln>
               <a:extLst>
                 <a:ext uri="{91240B29-F687-4f45-9708-019B960494DF}">
-                  <a14:hiddenLine xmlns:a14="http://schemas.microsoft.com/office/drawing/2010/main" xmlns="" w="9525">
+                  <a14:hiddenLine xmlns="" xmlns:a14="http://schemas.microsoft.com/office/drawing/2010/main" w="9525">
                     <a:solidFill>
                       <a:srgbClr val="000000"/>
                     </a:solidFill>
@@ -9838,7 +9838,7 @@
               </a:ln>
               <a:extLst>
                 <a:ext uri="{91240B29-F687-4f45-9708-019B960494DF}">
-                  <a14:hiddenLine xmlns:a14="http://schemas.microsoft.com/office/drawing/2010/main" xmlns="" w="9525">
+                  <a14:hiddenLine xmlns="" xmlns:a14="http://schemas.microsoft.com/office/drawing/2010/main" w="9525">
                     <a:solidFill>
                       <a:srgbClr val="000000"/>
                     </a:solidFill>
@@ -9948,7 +9948,7 @@
               </a:ln>
               <a:extLst>
                 <a:ext uri="{91240B29-F687-4f45-9708-019B960494DF}">
-                  <a14:hiddenLine xmlns:a14="http://schemas.microsoft.com/office/drawing/2010/main" xmlns="" w="9525">
+                  <a14:hiddenLine xmlns="" xmlns:a14="http://schemas.microsoft.com/office/drawing/2010/main" w="9525">
                     <a:solidFill>
                       <a:srgbClr val="000000"/>
                     </a:solidFill>
@@ -10032,7 +10032,7 @@
               </a:ln>
               <a:extLst>
                 <a:ext uri="{91240B29-F687-4f45-9708-019B960494DF}">
-                  <a14:hiddenLine xmlns:a14="http://schemas.microsoft.com/office/drawing/2010/main" xmlns="" w="9525">
+                  <a14:hiddenLine xmlns="" xmlns:a14="http://schemas.microsoft.com/office/drawing/2010/main" w="9525">
                     <a:solidFill>
                       <a:srgbClr val="000000"/>
                     </a:solidFill>
@@ -10094,7 +10094,7 @@
               </a:ln>
               <a:extLst>
                 <a:ext uri="{91240B29-F687-4f45-9708-019B960494DF}">
-                  <a14:hiddenLine xmlns:a14="http://schemas.microsoft.com/office/drawing/2010/main" xmlns="" w="9525">
+                  <a14:hiddenLine xmlns="" xmlns:a14="http://schemas.microsoft.com/office/drawing/2010/main" w="9525">
                     <a:solidFill>
                       <a:srgbClr val="000000"/>
                     </a:solidFill>
@@ -10156,7 +10156,7 @@
               </a:ln>
               <a:extLst>
                 <a:ext uri="{91240B29-F687-4f45-9708-019B960494DF}">
-                  <a14:hiddenLine xmlns:a14="http://schemas.microsoft.com/office/drawing/2010/main" xmlns="" w="9525">
+                  <a14:hiddenLine xmlns="" xmlns:a14="http://schemas.microsoft.com/office/drawing/2010/main" w="9525">
                     <a:solidFill>
                       <a:srgbClr val="000000"/>
                     </a:solidFill>
@@ -10246,7 +10246,7 @@
               </a:ln>
               <a:extLst>
                 <a:ext uri="{91240B29-F687-4f45-9708-019B960494DF}">
-                  <a14:hiddenLine xmlns:a14="http://schemas.microsoft.com/office/drawing/2010/main" xmlns="" w="9525">
+                  <a14:hiddenLine xmlns="" xmlns:a14="http://schemas.microsoft.com/office/drawing/2010/main" w="9525">
                     <a:solidFill>
                       <a:srgbClr val="000000"/>
                     </a:solidFill>
@@ -10280,7 +10280,7 @@
               </a:ln>
               <a:extLst>
                 <a:ext uri="{91240B29-F687-4f45-9708-019B960494DF}">
-                  <a14:hiddenLine xmlns:a14="http://schemas.microsoft.com/office/drawing/2010/main" xmlns="" w="9525">
+                  <a14:hiddenLine xmlns="" xmlns:a14="http://schemas.microsoft.com/office/drawing/2010/main" w="9525">
                     <a:solidFill>
                       <a:srgbClr val="000000"/>
                     </a:solidFill>
@@ -10345,7 +10345,7 @@
               </a:ln>
               <a:extLst>
                 <a:ext uri="{91240B29-F687-4f45-9708-019B960494DF}">
-                  <a14:hiddenLine xmlns:a14="http://schemas.microsoft.com/office/drawing/2010/main" xmlns="" w="9525">
+                  <a14:hiddenLine xmlns="" xmlns:a14="http://schemas.microsoft.com/office/drawing/2010/main" w="9525">
                     <a:solidFill>
                       <a:srgbClr val="000000"/>
                     </a:solidFill>
@@ -10435,7 +10435,7 @@
               </a:ln>
               <a:extLst>
                 <a:ext uri="{91240B29-F687-4f45-9708-019B960494DF}">
-                  <a14:hiddenLine xmlns:a14="http://schemas.microsoft.com/office/drawing/2010/main" xmlns="" w="9525">
+                  <a14:hiddenLine xmlns="" xmlns:a14="http://schemas.microsoft.com/office/drawing/2010/main" w="9525">
                     <a:solidFill>
                       <a:srgbClr val="000000"/>
                     </a:solidFill>
@@ -10497,7 +10497,7 @@
               </a:ln>
               <a:extLst>
                 <a:ext uri="{91240B29-F687-4f45-9708-019B960494DF}">
-                  <a14:hiddenLine xmlns:a14="http://schemas.microsoft.com/office/drawing/2010/main" xmlns="" w="9525">
+                  <a14:hiddenLine xmlns="" xmlns:a14="http://schemas.microsoft.com/office/drawing/2010/main" w="9525">
                     <a:solidFill>
                       <a:srgbClr val="000000"/>
                     </a:solidFill>
@@ -10587,7 +10587,7 @@
               </a:ln>
               <a:extLst>
                 <a:ext uri="{91240B29-F687-4f45-9708-019B960494DF}">
-                  <a14:hiddenLine xmlns:a14="http://schemas.microsoft.com/office/drawing/2010/main" xmlns="" w="9525">
+                  <a14:hiddenLine xmlns="" xmlns:a14="http://schemas.microsoft.com/office/drawing/2010/main" w="9525">
                     <a:solidFill>
                       <a:srgbClr val="000000"/>
                     </a:solidFill>
@@ -10652,7 +10652,7 @@
               </a:ln>
               <a:extLst>
                 <a:ext uri="{91240B29-F687-4f45-9708-019B960494DF}">
-                  <a14:hiddenLine xmlns:a14="http://schemas.microsoft.com/office/drawing/2010/main" xmlns="" w="9525">
+                  <a14:hiddenLine xmlns="" xmlns:a14="http://schemas.microsoft.com/office/drawing/2010/main" w="9525">
                     <a:solidFill>
                       <a:srgbClr val="000000"/>
                     </a:solidFill>
@@ -10714,7 +10714,7 @@
               </a:ln>
               <a:extLst>
                 <a:ext uri="{91240B29-F687-4f45-9708-019B960494DF}">
-                  <a14:hiddenLine xmlns:a14="http://schemas.microsoft.com/office/drawing/2010/main" xmlns="" w="9525">
+                  <a14:hiddenLine xmlns="" xmlns:a14="http://schemas.microsoft.com/office/drawing/2010/main" w="9525">
                     <a:solidFill>
                       <a:srgbClr val="000000"/>
                     </a:solidFill>
@@ -10804,7 +10804,7 @@
               </a:ln>
               <a:extLst>
                 <a:ext uri="{91240B29-F687-4f45-9708-019B960494DF}">
-                  <a14:hiddenLine xmlns:a14="http://schemas.microsoft.com/office/drawing/2010/main" xmlns="" w="9525">
+                  <a14:hiddenLine xmlns="" xmlns:a14="http://schemas.microsoft.com/office/drawing/2010/main" w="9525">
                     <a:solidFill>
                       <a:srgbClr val="000000"/>
                     </a:solidFill>
@@ -10894,7 +10894,7 @@
               </a:ln>
               <a:extLst>
                 <a:ext uri="{91240B29-F687-4f45-9708-019B960494DF}">
-                  <a14:hiddenLine xmlns:a14="http://schemas.microsoft.com/office/drawing/2010/main" xmlns="" w="9525">
+                  <a14:hiddenLine xmlns="" xmlns:a14="http://schemas.microsoft.com/office/drawing/2010/main" w="9525">
                     <a:solidFill>
                       <a:srgbClr val="000000"/>
                     </a:solidFill>
@@ -10959,7 +10959,7 @@
               </a:ln>
               <a:extLst>
                 <a:ext uri="{91240B29-F687-4f45-9708-019B960494DF}">
-                  <a14:hiddenLine xmlns:a14="http://schemas.microsoft.com/office/drawing/2010/main" xmlns="" w="9525">
+                  <a14:hiddenLine xmlns="" xmlns:a14="http://schemas.microsoft.com/office/drawing/2010/main" w="9525">
                     <a:solidFill>
                       <a:srgbClr val="000000"/>
                     </a:solidFill>
@@ -11079,7 +11079,7 @@
               </a:ln>
               <a:extLst>
                 <a:ext uri="{91240B29-F687-4f45-9708-019B960494DF}">
-                  <a14:hiddenLine xmlns:a14="http://schemas.microsoft.com/office/drawing/2010/main" xmlns="" w="9525">
+                  <a14:hiddenLine xmlns="" xmlns:a14="http://schemas.microsoft.com/office/drawing/2010/main" w="9525">
                     <a:solidFill>
                       <a:srgbClr val="000000"/>
                     </a:solidFill>
@@ -11177,7 +11177,7 @@
               </a:ln>
               <a:extLst>
                 <a:ext uri="{91240B29-F687-4f45-9708-019B960494DF}">
-                  <a14:hiddenLine xmlns:a14="http://schemas.microsoft.com/office/drawing/2010/main" xmlns="" w="9525">
+                  <a14:hiddenLine xmlns="" xmlns:a14="http://schemas.microsoft.com/office/drawing/2010/main" w="9525">
                     <a:solidFill>
                       <a:srgbClr val="000000"/>
                     </a:solidFill>
@@ -11292,7 +11292,7 @@
               </a:ln>
               <a:extLst>
                 <a:ext uri="{91240B29-F687-4f45-9708-019B960494DF}">
-                  <a14:hiddenLine xmlns:a14="http://schemas.microsoft.com/office/drawing/2010/main" xmlns="" w="9525">
+                  <a14:hiddenLine xmlns="" xmlns:a14="http://schemas.microsoft.com/office/drawing/2010/main" w="9525">
                     <a:solidFill>
                       <a:srgbClr val="000000"/>
                     </a:solidFill>
@@ -11382,7 +11382,7 @@
               </a:ln>
               <a:extLst>
                 <a:ext uri="{91240B29-F687-4f45-9708-019B960494DF}">
-                  <a14:hiddenLine xmlns:a14="http://schemas.microsoft.com/office/drawing/2010/main" xmlns="" w="9525">
+                  <a14:hiddenLine xmlns="" xmlns:a14="http://schemas.microsoft.com/office/drawing/2010/main" w="9525">
                     <a:solidFill>
                       <a:srgbClr val="000000"/>
                     </a:solidFill>
@@ -11447,7 +11447,7 @@
               </a:ln>
               <a:extLst>
                 <a:ext uri="{91240B29-F687-4f45-9708-019B960494DF}">
-                  <a14:hiddenLine xmlns:a14="http://schemas.microsoft.com/office/drawing/2010/main" xmlns="" w="9525">
+                  <a14:hiddenLine xmlns="" xmlns:a14="http://schemas.microsoft.com/office/drawing/2010/main" w="9525">
                     <a:solidFill>
                       <a:srgbClr val="000000"/>
                     </a:solidFill>
@@ -11537,7 +11537,7 @@
               </a:ln>
               <a:extLst>
                 <a:ext uri="{91240B29-F687-4f45-9708-019B960494DF}">
-                  <a14:hiddenLine xmlns:a14="http://schemas.microsoft.com/office/drawing/2010/main" xmlns="" w="9525">
+                  <a14:hiddenLine xmlns="" xmlns:a14="http://schemas.microsoft.com/office/drawing/2010/main" w="9525">
                     <a:solidFill>
                       <a:srgbClr val="000000"/>
                     </a:solidFill>
@@ -11605,7 +11605,7 @@
               </a:ln>
               <a:extLst>
                 <a:ext uri="{91240B29-F687-4f45-9708-019B960494DF}">
-                  <a14:hiddenLine xmlns:a14="http://schemas.microsoft.com/office/drawing/2010/main" xmlns="" w="9525">
+                  <a14:hiddenLine xmlns="" xmlns:a14="http://schemas.microsoft.com/office/drawing/2010/main" w="9525">
                     <a:solidFill>
                       <a:srgbClr val="000000"/>
                     </a:solidFill>
@@ -11695,7 +11695,7 @@
               </a:ln>
               <a:extLst>
                 <a:ext uri="{91240B29-F687-4f45-9708-019B960494DF}">
-                  <a14:hiddenLine xmlns:a14="http://schemas.microsoft.com/office/drawing/2010/main" xmlns="" w="9525">
+                  <a14:hiddenLine xmlns="" xmlns:a14="http://schemas.microsoft.com/office/drawing/2010/main" w="9525">
                     <a:solidFill>
                       <a:srgbClr val="000000"/>
                     </a:solidFill>
@@ -11763,7 +11763,7 @@
               </a:ln>
               <a:extLst>
                 <a:ext uri="{91240B29-F687-4f45-9708-019B960494DF}">
-                  <a14:hiddenLine xmlns:a14="http://schemas.microsoft.com/office/drawing/2010/main" xmlns="" w="9525">
+                  <a14:hiddenLine xmlns="" xmlns:a14="http://schemas.microsoft.com/office/drawing/2010/main" w="9525">
                     <a:solidFill>
                       <a:srgbClr val="000000"/>
                     </a:solidFill>
@@ -11853,7 +11853,7 @@
               </a:ln>
               <a:extLst>
                 <a:ext uri="{91240B29-F687-4f45-9708-019B960494DF}">
-                  <a14:hiddenLine xmlns:a14="http://schemas.microsoft.com/office/drawing/2010/main" xmlns="" w="9525">
+                  <a14:hiddenLine xmlns="" xmlns:a14="http://schemas.microsoft.com/office/drawing/2010/main" w="9525">
                     <a:solidFill>
                       <a:srgbClr val="000000"/>
                     </a:solidFill>
@@ -11887,7 +11887,7 @@
               </a:ln>
               <a:extLst>
                 <a:ext uri="{91240B29-F687-4f45-9708-019B960494DF}">
-                  <a14:hiddenLine xmlns:a14="http://schemas.microsoft.com/office/drawing/2010/main" xmlns="" w="9525">
+                  <a14:hiddenLine xmlns="" xmlns:a14="http://schemas.microsoft.com/office/drawing/2010/main" w="9525">
                     <a:solidFill>
                       <a:srgbClr val="000000"/>
                     </a:solidFill>
@@ -12027,7 +12027,7 @@
           <a:p>
             <a:fld id="{5969946C-D33D-4FE7-A308-266207BA8A2A}" type="datetimeFigureOut">
               <a:rPr lang="en-CA" smtClean="0"/>
-              <a:t>2018-03-15</a:t>
+              <a:t>2018-03-28</a:t>
             </a:fld>
             <a:endParaRPr lang="en-CA"/>
           </a:p>

</xml_diff>